<commit_message>
Modification (élagage) du diaporama 1 (BB84 protocol)
</commit_message>
<xml_diff>
--- a/Simulations of Quantum Cryptography.pptx
+++ b/Simulations of Quantum Cryptography.pptx
@@ -8,8 +8,10 @@
     <p:sldId id="256" r:id="rId2"/>
     <p:sldId id="257" r:id="rId3"/>
     <p:sldId id="258" r:id="rId4"/>
-    <p:sldId id="259" r:id="rId5"/>
-    <p:sldId id="260" r:id="rId6"/>
+    <p:sldId id="261" r:id="rId5"/>
+    <p:sldId id="259" r:id="rId6"/>
+    <p:sldId id="260" r:id="rId7"/>
+    <p:sldId id="262" r:id="rId8"/>
   </p:sldIdLst>
   <p:sldSz cx="12192000" cy="6858000"/>
   <p:notesSz cx="6858000" cy="9144000"/>
@@ -619,7 +621,7 @@
             <a:fld id="{B61BEF0D-F0BB-DE4B-95CE-6DB70DBA9567}" type="datetimeFigureOut">
               <a:rPr lang="en-US" dirty="0"/>
               <a:pPr/>
-              <a:t>5/13/2015</a:t>
+              <a:t>5/20/2015</a:t>
             </a:fld>
             <a:endParaRPr lang="en-US" dirty="0"/>
           </a:p>
@@ -912,7 +914,7 @@
             <a:fld id="{B61BEF0D-F0BB-DE4B-95CE-6DB70DBA9567}" type="datetimeFigureOut">
               <a:rPr lang="en-US" dirty="0"/>
               <a:pPr/>
-              <a:t>5/13/2015</a:t>
+              <a:t>5/20/2015</a:t>
             </a:fld>
             <a:endParaRPr lang="en-US" dirty="0"/>
           </a:p>
@@ -1157,7 +1159,7 @@
             <a:fld id="{B61BEF0D-F0BB-DE4B-95CE-6DB70DBA9567}" type="datetimeFigureOut">
               <a:rPr lang="en-US" dirty="0"/>
               <a:pPr/>
-              <a:t>5/13/2015</a:t>
+              <a:t>5/20/2015</a:t>
             </a:fld>
             <a:endParaRPr lang="en-US" dirty="0"/>
           </a:p>
@@ -1694,7 +1696,7 @@
             <a:fld id="{B61BEF0D-F0BB-DE4B-95CE-6DB70DBA9567}" type="datetimeFigureOut">
               <a:rPr lang="en-US" dirty="0"/>
               <a:pPr/>
-              <a:t>5/13/2015</a:t>
+              <a:t>5/20/2015</a:t>
             </a:fld>
             <a:endParaRPr lang="en-US" dirty="0"/>
           </a:p>
@@ -1939,7 +1941,7 @@
             <a:fld id="{B61BEF0D-F0BB-DE4B-95CE-6DB70DBA9567}" type="datetimeFigureOut">
               <a:rPr lang="en-US" dirty="0"/>
               <a:pPr/>
-              <a:t>5/13/2015</a:t>
+              <a:t>5/20/2015</a:t>
             </a:fld>
             <a:endParaRPr lang="en-US" dirty="0"/>
           </a:p>
@@ -2468,7 +2470,7 @@
             <a:fld id="{B61BEF0D-F0BB-DE4B-95CE-6DB70DBA9567}" type="datetimeFigureOut">
               <a:rPr lang="en-US" dirty="0"/>
               <a:pPr/>
-              <a:t>5/13/2015</a:t>
+              <a:t>5/20/2015</a:t>
             </a:fld>
             <a:endParaRPr lang="en-US" dirty="0"/>
           </a:p>
@@ -2762,7 +2764,7 @@
             <a:fld id="{B61BEF0D-F0BB-DE4B-95CE-6DB70DBA9567}" type="datetimeFigureOut">
               <a:rPr lang="en-US" dirty="0"/>
               <a:pPr/>
-              <a:t>5/13/2015</a:t>
+              <a:t>5/20/2015</a:t>
             </a:fld>
             <a:endParaRPr lang="en-US" dirty="0"/>
           </a:p>
@@ -2933,7 +2935,7 @@
             <a:fld id="{B61BEF0D-F0BB-DE4B-95CE-6DB70DBA9567}" type="datetimeFigureOut">
               <a:rPr lang="en-US" dirty="0"/>
               <a:pPr/>
-              <a:t>5/13/2015</a:t>
+              <a:t>5/20/2015</a:t>
             </a:fld>
             <a:endParaRPr lang="en-US" dirty="0"/>
           </a:p>
@@ -3110,7 +3112,7 @@
             <a:fld id="{B61BEF0D-F0BB-DE4B-95CE-6DB70DBA9567}" type="datetimeFigureOut">
               <a:rPr lang="en-US" dirty="0"/>
               <a:pPr/>
-              <a:t>5/13/2015</a:t>
+              <a:t>5/20/2015</a:t>
             </a:fld>
             <a:endParaRPr lang="en-US" dirty="0"/>
           </a:p>
@@ -3277,7 +3279,7 @@
             <a:fld id="{B61BEF0D-F0BB-DE4B-95CE-6DB70DBA9567}" type="datetimeFigureOut">
               <a:rPr lang="en-US" dirty="0"/>
               <a:pPr/>
-              <a:t>5/13/2015</a:t>
+              <a:t>5/20/2015</a:t>
             </a:fld>
             <a:endParaRPr lang="en-US" dirty="0"/>
           </a:p>
@@ -3525,7 +3527,7 @@
             <a:fld id="{B61BEF0D-F0BB-DE4B-95CE-6DB70DBA9567}" type="datetimeFigureOut">
               <a:rPr lang="en-US" dirty="0"/>
               <a:pPr/>
-              <a:t>5/13/2015</a:t>
+              <a:t>5/20/2015</a:t>
             </a:fld>
             <a:endParaRPr lang="en-US" dirty="0"/>
           </a:p>
@@ -3819,7 +3821,7 @@
             <a:fld id="{B61BEF0D-F0BB-DE4B-95CE-6DB70DBA9567}" type="datetimeFigureOut">
               <a:rPr lang="en-US" dirty="0"/>
               <a:pPr/>
-              <a:t>5/13/2015</a:t>
+              <a:t>5/20/2015</a:t>
             </a:fld>
             <a:endParaRPr lang="en-US" dirty="0"/>
           </a:p>
@@ -4258,7 +4260,7 @@
             <a:fld id="{B61BEF0D-F0BB-DE4B-95CE-6DB70DBA9567}" type="datetimeFigureOut">
               <a:rPr lang="en-US" dirty="0"/>
               <a:pPr/>
-              <a:t>5/13/2015</a:t>
+              <a:t>5/20/2015</a:t>
             </a:fld>
             <a:endParaRPr lang="en-US" dirty="0"/>
           </a:p>
@@ -4373,7 +4375,7 @@
             <a:fld id="{B61BEF0D-F0BB-DE4B-95CE-6DB70DBA9567}" type="datetimeFigureOut">
               <a:rPr lang="en-US" dirty="0"/>
               <a:pPr/>
-              <a:t>5/13/2015</a:t>
+              <a:t>5/20/2015</a:t>
             </a:fld>
             <a:endParaRPr lang="en-US" dirty="0"/>
           </a:p>
@@ -4465,7 +4467,7 @@
             <a:fld id="{B61BEF0D-F0BB-DE4B-95CE-6DB70DBA9567}" type="datetimeFigureOut">
               <a:rPr lang="en-US" dirty="0"/>
               <a:pPr/>
-              <a:t>5/13/2015</a:t>
+              <a:t>5/20/2015</a:t>
             </a:fld>
             <a:endParaRPr lang="en-US" dirty="0"/>
           </a:p>
@@ -4745,7 +4747,7 @@
             <a:fld id="{B61BEF0D-F0BB-DE4B-95CE-6DB70DBA9567}" type="datetimeFigureOut">
               <a:rPr lang="en-US" dirty="0"/>
               <a:pPr/>
-              <a:t>5/13/2015</a:t>
+              <a:t>5/20/2015</a:t>
             </a:fld>
             <a:endParaRPr lang="en-US" dirty="0"/>
           </a:p>
@@ -5033,7 +5035,7 @@
             <a:fld id="{B61BEF0D-F0BB-DE4B-95CE-6DB70DBA9567}" type="datetimeFigureOut">
               <a:rPr lang="en-US" dirty="0"/>
               <a:pPr/>
-              <a:t>5/13/2015</a:t>
+              <a:t>5/20/2015</a:t>
             </a:fld>
             <a:endParaRPr lang="en-US" dirty="0"/>
           </a:p>
@@ -5560,7 +5562,7 @@
             <a:fld id="{B61BEF0D-F0BB-DE4B-95CE-6DB70DBA9567}" type="datetimeFigureOut">
               <a:rPr lang="en-US" dirty="0"/>
               <a:pPr/>
-              <a:t>5/13/2015</a:t>
+              <a:t>5/20/2015</a:t>
             </a:fld>
             <a:endParaRPr lang="en-US" dirty="0"/>
           </a:p>
@@ -6304,7 +6306,7 @@
         </p:nvSpPr>
         <p:spPr>
           <a:xfrm>
-            <a:off x="1484309" y="163913"/>
+            <a:off x="1484309" y="249506"/>
             <a:ext cx="10018713" cy="1014960"/>
           </a:xfrm>
         </p:spPr>
@@ -6366,7 +6368,7 @@
         </p:blipFill>
         <p:spPr>
           <a:xfrm>
-            <a:off x="1319951" y="1609432"/>
+            <a:off x="1590408" y="1540835"/>
             <a:ext cx="634921" cy="1269841"/>
           </a:xfrm>
           <a:prstGeom prst="rect">
@@ -6382,7 +6384,7 @@
         </p:nvSpPr>
         <p:spPr>
           <a:xfrm>
-            <a:off x="1969307" y="1784186"/>
+            <a:off x="2239764" y="1715589"/>
             <a:ext cx="5461803" cy="923330"/>
           </a:xfrm>
           <a:prstGeom prst="rect">
@@ -6515,8 +6517,8 @@
         </p:blipFill>
         <p:spPr>
           <a:xfrm>
-            <a:off x="8469900" y="1425114"/>
-            <a:ext cx="2420479" cy="2420479"/>
+            <a:off x="1719198" y="2826054"/>
+            <a:ext cx="3558968" cy="3558968"/>
           </a:xfrm>
           <a:prstGeom prst="rect">
             <a:avLst/>
@@ -6531,7 +6533,7 @@
         </p:nvSpPr>
         <p:spPr>
           <a:xfrm>
-            <a:off x="1969307" y="2922263"/>
+            <a:off x="5581964" y="3099755"/>
             <a:ext cx="5461803" cy="923330"/>
           </a:xfrm>
           <a:prstGeom prst="rect">
@@ -6645,236 +6647,6 @@
             <a:r>
               <a:rPr lang="fr-FR" dirty="0" smtClean="0"/>
               <a:t>.</a:t>
-            </a:r>
-            <a:endParaRPr lang="fr-FR" dirty="0"/>
-          </a:p>
-        </p:txBody>
-      </p:sp>
-      <p:sp>
-        <p:nvSpPr>
-          <p:cNvPr id="11" name="ZoneTexte 10"/>
-          <p:cNvSpPr txBox="1"/>
-          <p:nvPr/>
-        </p:nvSpPr>
-        <p:spPr>
-          <a:xfrm>
-            <a:off x="1969306" y="4163810"/>
-            <a:ext cx="5461803" cy="923330"/>
-          </a:xfrm>
-          <a:prstGeom prst="rect">
-            <a:avLst/>
-          </a:prstGeom>
-          <a:noFill/>
-        </p:spPr>
-        <p:txBody>
-          <a:bodyPr wrap="square" rtlCol="0">
-            <a:spAutoFit/>
-          </a:bodyPr>
-          <a:lstStyle/>
-          <a:p>
-            <a:pPr algn="just"/>
-            <a:r>
-              <a:rPr lang="fr-FR" dirty="0" smtClean="0"/>
-              <a:t>Once Bob has </a:t>
-            </a:r>
-            <a:r>
-              <a:rPr lang="fr-FR" dirty="0" err="1" smtClean="0"/>
-              <a:t>received</a:t>
-            </a:r>
-            <a:r>
-              <a:rPr lang="fr-FR" dirty="0" smtClean="0"/>
-              <a:t> all the photons, </a:t>
-            </a:r>
-            <a:r>
-              <a:rPr lang="fr-FR" dirty="0" err="1" smtClean="0"/>
-              <a:t>he</a:t>
-            </a:r>
-            <a:r>
-              <a:rPr lang="fr-FR" dirty="0" smtClean="0"/>
-              <a:t> uses a public </a:t>
-            </a:r>
-            <a:r>
-              <a:rPr lang="fr-FR" dirty="0" err="1" smtClean="0"/>
-              <a:t>channel</a:t>
-            </a:r>
-            <a:r>
-              <a:rPr lang="fr-FR" dirty="0" smtClean="0"/>
-              <a:t> to tell Alice </a:t>
-            </a:r>
-            <a:r>
-              <a:rPr lang="fr-FR" dirty="0" err="1" smtClean="0"/>
-              <a:t>which</a:t>
-            </a:r>
-            <a:r>
-              <a:rPr lang="fr-FR" dirty="0" smtClean="0"/>
-              <a:t> </a:t>
-            </a:r>
-            <a:r>
-              <a:rPr lang="fr-FR" dirty="0" err="1" smtClean="0"/>
-              <a:t>filter</a:t>
-            </a:r>
-            <a:r>
-              <a:rPr lang="fr-FR" dirty="0" smtClean="0"/>
-              <a:t> </a:t>
-            </a:r>
-            <a:r>
-              <a:rPr lang="fr-FR" dirty="0" err="1" smtClean="0"/>
-              <a:t>he</a:t>
-            </a:r>
-            <a:r>
-              <a:rPr lang="fr-FR" dirty="0" smtClean="0"/>
-              <a:t> </a:t>
-            </a:r>
-            <a:r>
-              <a:rPr lang="fr-FR" dirty="0" err="1" smtClean="0"/>
-              <a:t>used</a:t>
-            </a:r>
-            <a:r>
-              <a:rPr lang="fr-FR" dirty="0" smtClean="0"/>
-              <a:t> to </a:t>
-            </a:r>
-            <a:r>
-              <a:rPr lang="fr-FR" dirty="0" err="1" smtClean="0"/>
-              <a:t>measure</a:t>
-            </a:r>
-            <a:r>
-              <a:rPr lang="fr-FR" dirty="0" smtClean="0"/>
-              <a:t> </a:t>
-            </a:r>
-            <a:r>
-              <a:rPr lang="fr-FR" dirty="0" err="1" smtClean="0"/>
-              <a:t>every</a:t>
-            </a:r>
-            <a:r>
-              <a:rPr lang="fr-FR" dirty="0" smtClean="0"/>
-              <a:t> photon.</a:t>
-            </a:r>
-            <a:endParaRPr lang="fr-FR" dirty="0"/>
-          </a:p>
-        </p:txBody>
-      </p:sp>
-      <p:sp>
-        <p:nvSpPr>
-          <p:cNvPr id="13" name="ZoneTexte 12"/>
-          <p:cNvSpPr txBox="1"/>
-          <p:nvPr/>
-        </p:nvSpPr>
-        <p:spPr>
-          <a:xfrm>
-            <a:off x="1954872" y="5244880"/>
-            <a:ext cx="5461803" cy="923330"/>
-          </a:xfrm>
-          <a:prstGeom prst="rect">
-            <a:avLst/>
-          </a:prstGeom>
-          <a:noFill/>
-        </p:spPr>
-        <p:txBody>
-          <a:bodyPr wrap="square" rtlCol="0">
-            <a:spAutoFit/>
-          </a:bodyPr>
-          <a:lstStyle/>
-          <a:p>
-            <a:pPr algn="just"/>
-            <a:r>
-              <a:rPr lang="fr-FR" dirty="0" smtClean="0"/>
-              <a:t>Alice tells Bob </a:t>
-            </a:r>
-            <a:r>
-              <a:rPr lang="fr-FR" dirty="0" err="1" smtClean="0"/>
-              <a:t>which</a:t>
-            </a:r>
-            <a:r>
-              <a:rPr lang="fr-FR" dirty="0" smtClean="0"/>
-              <a:t>  </a:t>
-            </a:r>
-            <a:r>
-              <a:rPr lang="fr-FR" dirty="0" err="1" smtClean="0"/>
-              <a:t>filter</a:t>
-            </a:r>
-            <a:r>
-              <a:rPr lang="fr-FR" dirty="0" smtClean="0"/>
-              <a:t> </a:t>
-            </a:r>
-            <a:r>
-              <a:rPr lang="fr-FR" dirty="0" err="1" smtClean="0"/>
-              <a:t>he</a:t>
-            </a:r>
-            <a:r>
-              <a:rPr lang="fr-FR" dirty="0" smtClean="0"/>
-              <a:t> uses </a:t>
-            </a:r>
-            <a:r>
-              <a:rPr lang="fr-FR" dirty="0" err="1" smtClean="0"/>
-              <a:t>correctly</a:t>
-            </a:r>
-            <a:r>
-              <a:rPr lang="fr-FR" dirty="0" smtClean="0"/>
-              <a:t>. The bits </a:t>
-            </a:r>
-            <a:r>
-              <a:rPr lang="fr-FR" dirty="0" err="1" smtClean="0"/>
-              <a:t>corresponding</a:t>
-            </a:r>
-            <a:r>
-              <a:rPr lang="fr-FR" dirty="0" smtClean="0"/>
-              <a:t> to the photons </a:t>
-            </a:r>
-            <a:r>
-              <a:rPr lang="fr-FR" dirty="0" err="1" smtClean="0"/>
-              <a:t>that</a:t>
-            </a:r>
-            <a:r>
-              <a:rPr lang="fr-FR" dirty="0" smtClean="0"/>
-              <a:t> have been </a:t>
-            </a:r>
-            <a:r>
-              <a:rPr lang="fr-FR" dirty="0" err="1" smtClean="0"/>
-              <a:t>correctly</a:t>
-            </a:r>
-            <a:r>
-              <a:rPr lang="fr-FR" dirty="0" smtClean="0"/>
-              <a:t> </a:t>
-            </a:r>
-            <a:r>
-              <a:rPr lang="fr-FR" dirty="0" err="1" smtClean="0"/>
-              <a:t>measured</a:t>
-            </a:r>
-            <a:r>
-              <a:rPr lang="fr-FR" dirty="0" smtClean="0"/>
-              <a:t> </a:t>
-            </a:r>
-            <a:r>
-              <a:rPr lang="fr-FR" dirty="0" err="1" smtClean="0"/>
-              <a:t>will</a:t>
-            </a:r>
-            <a:r>
-              <a:rPr lang="fr-FR" dirty="0" smtClean="0"/>
-              <a:t> </a:t>
-            </a:r>
-            <a:r>
-              <a:rPr lang="fr-FR" dirty="0" err="1" smtClean="0"/>
-              <a:t>be</a:t>
-            </a:r>
-            <a:r>
-              <a:rPr lang="fr-FR" dirty="0" smtClean="0"/>
-              <a:t> </a:t>
-            </a:r>
-            <a:r>
-              <a:rPr lang="fr-FR" dirty="0" err="1" smtClean="0"/>
-              <a:t>used</a:t>
-            </a:r>
-            <a:r>
-              <a:rPr lang="fr-FR" dirty="0" smtClean="0"/>
-              <a:t> to </a:t>
-            </a:r>
-            <a:r>
-              <a:rPr lang="fr-FR" dirty="0" err="1" smtClean="0"/>
-              <a:t>form</a:t>
-            </a:r>
-            <a:r>
-              <a:rPr lang="fr-FR" dirty="0" smtClean="0"/>
-              <a:t> the key.</a:t>
             </a:r>
             <a:endParaRPr lang="fr-FR" dirty="0"/>
           </a:p>
@@ -6902,98 +6674,8 @@
         </p:blipFill>
         <p:spPr>
           <a:xfrm>
-            <a:off x="7431333" y="2734860"/>
+            <a:off x="11043990" y="2912352"/>
             <a:ext cx="634921" cy="1269841"/>
-          </a:xfrm>
-          <a:prstGeom prst="rect">
-            <a:avLst/>
-          </a:prstGeom>
-        </p:spPr>
-      </p:pic>
-      <p:pic>
-        <p:nvPicPr>
-          <p:cNvPr id="19" name="Image 18"/>
-          <p:cNvPicPr>
-            <a:picLocks noChangeAspect="1"/>
-          </p:cNvPicPr>
-          <p:nvPr/>
-        </p:nvPicPr>
-        <p:blipFill>
-          <a:blip r:embed="rId5">
-            <a:extLst>
-              <a:ext uri="{28A0092B-C50C-407E-A947-70E740481C1C}">
-                <a14:useLocalDpi xmlns:a14="http://schemas.microsoft.com/office/drawing/2010/main" val="0"/>
-              </a:ext>
-            </a:extLst>
-          </a:blip>
-          <a:stretch>
-            <a:fillRect/>
-          </a:stretch>
-        </p:blipFill>
-        <p:spPr>
-          <a:xfrm>
-            <a:off x="1334385" y="3990554"/>
-            <a:ext cx="634921" cy="1269841"/>
-          </a:xfrm>
-          <a:prstGeom prst="rect">
-            <a:avLst/>
-          </a:prstGeom>
-        </p:spPr>
-      </p:pic>
-      <p:pic>
-        <p:nvPicPr>
-          <p:cNvPr id="20" name="Image 19"/>
-          <p:cNvPicPr>
-            <a:picLocks noChangeAspect="1"/>
-          </p:cNvPicPr>
-          <p:nvPr/>
-        </p:nvPicPr>
-        <p:blipFill>
-          <a:blip r:embed="rId6">
-            <a:extLst>
-              <a:ext uri="{28A0092B-C50C-407E-A947-70E740481C1C}">
-                <a14:useLocalDpi xmlns:a14="http://schemas.microsoft.com/office/drawing/2010/main" val="0"/>
-              </a:ext>
-            </a:extLst>
-          </a:blip>
-          <a:stretch>
-            <a:fillRect/>
-          </a:stretch>
-        </p:blipFill>
-        <p:spPr>
-          <a:xfrm>
-            <a:off x="7431332" y="5071624"/>
-            <a:ext cx="634921" cy="1269841"/>
-          </a:xfrm>
-          <a:prstGeom prst="rect">
-            <a:avLst/>
-          </a:prstGeom>
-        </p:spPr>
-      </p:pic>
-      <p:pic>
-        <p:nvPicPr>
-          <p:cNvPr id="21" name="Image 20"/>
-          <p:cNvPicPr>
-            <a:picLocks noChangeAspect="1"/>
-          </p:cNvPicPr>
-          <p:nvPr/>
-        </p:nvPicPr>
-        <p:blipFill>
-          <a:blip r:embed="rId7">
-            <a:extLst>
-              <a:ext uri="{28A0092B-C50C-407E-A947-70E740481C1C}">
-                <a14:useLocalDpi xmlns:a14="http://schemas.microsoft.com/office/drawing/2010/main" val="0"/>
-              </a:ext>
-            </a:extLst>
-          </a:blip>
-          <a:stretch>
-            <a:fillRect/>
-          </a:stretch>
-        </p:blipFill>
-        <p:spPr>
-          <a:xfrm>
-            <a:off x="8130423" y="4227439"/>
-            <a:ext cx="4061577" cy="1719401"/>
           </a:xfrm>
           <a:prstGeom prst="rect">
             <a:avLst/>
@@ -7039,35 +6721,58 @@
       </p:grpSpPr>
       <p:sp>
         <p:nvSpPr>
-          <p:cNvPr id="2" name="Titre 1"/>
-          <p:cNvSpPr>
-            <a:spLocks noGrp="1"/>
-          </p:cNvSpPr>
-          <p:nvPr>
-            <p:ph type="title"/>
-          </p:nvPr>
+          <p:cNvPr id="4" name="ZoneTexte 3"/>
+          <p:cNvSpPr txBox="1"/>
+          <p:nvPr/>
         </p:nvSpPr>
         <p:spPr>
           <a:xfrm>
-            <a:off x="1484309" y="209281"/>
-            <a:ext cx="10018713" cy="1752599"/>
+            <a:off x="2407188" y="403179"/>
+            <a:ext cx="5461803" cy="923330"/>
           </a:xfrm>
+          <a:prstGeom prst="rect">
+            <a:avLst/>
+          </a:prstGeom>
+          <a:noFill/>
         </p:spPr>
         <p:txBody>
-          <a:bodyPr/>
+          <a:bodyPr wrap="square" rtlCol="0">
+            <a:spAutoFit/>
+          </a:bodyPr>
           <a:lstStyle/>
           <a:p>
+            <a:pPr algn="just"/>
+            <a:r>
+              <a:rPr lang="fr-FR" dirty="0" smtClean="0"/>
+              <a:t>Once Bob has </a:t>
+            </a:r>
             <a:r>
               <a:rPr lang="fr-FR" dirty="0" err="1" smtClean="0"/>
-              <a:t>What</a:t>
+              <a:t>received</a:t>
             </a:r>
             <a:r>
               <a:rPr lang="fr-FR" dirty="0" smtClean="0"/>
-              <a:t> if </a:t>
+              <a:t> all the photons, </a:t>
             </a:r>
             <a:r>
               <a:rPr lang="fr-FR" dirty="0" err="1" smtClean="0"/>
-              <a:t>someone</a:t>
+              <a:t>he</a:t>
+            </a:r>
+            <a:r>
+              <a:rPr lang="fr-FR" dirty="0" smtClean="0"/>
+              <a:t> uses a public </a:t>
+            </a:r>
+            <a:r>
+              <a:rPr lang="fr-FR" dirty="0" err="1" smtClean="0"/>
+              <a:t>channel</a:t>
+            </a:r>
+            <a:r>
+              <a:rPr lang="fr-FR" dirty="0" smtClean="0"/>
+              <a:t> to tell Alice </a:t>
+            </a:r>
+            <a:r>
+              <a:rPr lang="fr-FR" dirty="0" err="1" smtClean="0"/>
+              <a:t>which</a:t>
             </a:r>
             <a:r>
               <a:rPr lang="fr-FR" dirty="0" smtClean="0"/>
@@ -7075,7 +6780,7 @@
             </a:r>
             <a:r>
               <a:rPr lang="fr-FR" dirty="0" err="1" smtClean="0"/>
-              <a:t>is</a:t>
+              <a:t>filter</a:t>
             </a:r>
             <a:r>
               <a:rPr lang="fr-FR" dirty="0" smtClean="0"/>
@@ -7083,7 +6788,15 @@
             </a:r>
             <a:r>
               <a:rPr lang="fr-FR" dirty="0" err="1" smtClean="0"/>
-              <a:t>trying</a:t>
+              <a:t>he</a:t>
+            </a:r>
+            <a:r>
+              <a:rPr lang="fr-FR" dirty="0" smtClean="0"/>
+              <a:t> </a:t>
+            </a:r>
+            <a:r>
+              <a:rPr lang="fr-FR" dirty="0" err="1" smtClean="0"/>
+              <a:t>used</a:t>
             </a:r>
             <a:r>
               <a:rPr lang="fr-FR" dirty="0" smtClean="0"/>
@@ -7091,11 +6804,19 @@
             </a:r>
             <a:r>
               <a:rPr lang="fr-FR" dirty="0" err="1" smtClean="0"/>
-              <a:t>eavesdrop</a:t>
+              <a:t>measure</a:t>
             </a:r>
             <a:r>
               <a:rPr lang="fr-FR" dirty="0" smtClean="0"/>
-              <a:t> on Alice and Bob?</a:t>
+              <a:t> </a:t>
+            </a:r>
+            <a:r>
+              <a:rPr lang="fr-FR" dirty="0" err="1" smtClean="0"/>
+              <a:t>every</a:t>
+            </a:r>
+            <a:r>
+              <a:rPr lang="fr-FR" dirty="0" smtClean="0"/>
+              <a:t> photon.</a:t>
             </a:r>
             <a:endParaRPr lang="fr-FR" dirty="0"/>
           </a:p>
@@ -7103,36 +6824,42 @@
       </p:sp>
       <p:sp>
         <p:nvSpPr>
-          <p:cNvPr id="3" name="Espace réservé du contenu 2"/>
-          <p:cNvSpPr>
-            <a:spLocks noGrp="1"/>
-          </p:cNvSpPr>
-          <p:nvPr>
-            <p:ph idx="1"/>
-          </p:nvPr>
-        </p:nvSpPr>
-        <p:spPr/>
-        <p:txBody>
-          <a:bodyPr>
-            <a:normAutofit fontScale="85000" lnSpcReduction="10000"/>
+          <p:cNvPr id="5" name="ZoneTexte 4"/>
+          <p:cNvSpPr txBox="1"/>
+          <p:nvPr/>
+        </p:nvSpPr>
+        <p:spPr>
+          <a:xfrm>
+            <a:off x="5399521" y="1814685"/>
+            <a:ext cx="5461803" cy="923330"/>
+          </a:xfrm>
+          <a:prstGeom prst="rect">
+            <a:avLst/>
+          </a:prstGeom>
+          <a:noFill/>
+        </p:spPr>
+        <p:txBody>
+          <a:bodyPr wrap="square" rtlCol="0">
+            <a:spAutoFit/>
           </a:bodyPr>
           <a:lstStyle/>
           <a:p>
+            <a:pPr algn="just"/>
             <a:r>
               <a:rPr lang="fr-FR" dirty="0" smtClean="0"/>
-              <a:t>Eve the </a:t>
+              <a:t>Alice tells Bob </a:t>
             </a:r>
             <a:r>
               <a:rPr lang="fr-FR" dirty="0" err="1" smtClean="0"/>
-              <a:t>eavesdropper</a:t>
+              <a:t>which</a:t>
             </a:r>
             <a:r>
               <a:rPr lang="fr-FR" dirty="0" smtClean="0"/>
-              <a:t> has </a:t>
+              <a:t>  </a:t>
             </a:r>
             <a:r>
               <a:rPr lang="fr-FR" dirty="0" err="1" smtClean="0"/>
-              <a:t>only</a:t>
+              <a:t>filter</a:t>
             </a:r>
             <a:r>
               <a:rPr lang="fr-FR" dirty="0" smtClean="0"/>
@@ -7140,35 +6867,39 @@
             </a:r>
             <a:r>
               <a:rPr lang="fr-FR" dirty="0" err="1" smtClean="0"/>
-              <a:t>rectilinear</a:t>
+              <a:t>he</a:t>
             </a:r>
             <a:r>
               <a:rPr lang="fr-FR" dirty="0" smtClean="0"/>
-              <a:t> and diagonal </a:t>
+              <a:t> uses </a:t>
             </a:r>
             <a:r>
               <a:rPr lang="fr-FR" dirty="0" err="1" smtClean="0"/>
-              <a:t>filters</a:t>
-            </a:r>
-            <a:r>
-              <a:rPr lang="fr-FR" dirty="0"/>
-              <a:t> </a:t>
+              <a:t>correctly</a:t>
             </a:r>
             <a:r>
               <a:rPr lang="fr-FR" dirty="0" smtClean="0"/>
-              <a:t>and </a:t>
+              <a:t>. The bits </a:t>
             </a:r>
             <a:r>
               <a:rPr lang="fr-FR" dirty="0" err="1" smtClean="0"/>
-              <a:t>does</a:t>
+              <a:t>corresponding</a:t>
             </a:r>
             <a:r>
               <a:rPr lang="fr-FR" dirty="0" smtClean="0"/>
-              <a:t> not know </a:t>
+              <a:t> to the photons </a:t>
             </a:r>
             <a:r>
               <a:rPr lang="fr-FR" dirty="0" err="1" smtClean="0"/>
-              <a:t>which</a:t>
+              <a:t>that</a:t>
+            </a:r>
+            <a:r>
+              <a:rPr lang="fr-FR" dirty="0" smtClean="0"/>
+              <a:t> have been </a:t>
+            </a:r>
+            <a:r>
+              <a:rPr lang="fr-FR" dirty="0" err="1" smtClean="0"/>
+              <a:t>correctly</a:t>
             </a:r>
             <a:r>
               <a:rPr lang="fr-FR" dirty="0" smtClean="0"/>
@@ -7176,11 +6907,27 @@
             </a:r>
             <a:r>
               <a:rPr lang="fr-FR" dirty="0" err="1" smtClean="0"/>
-              <a:t>filter</a:t>
+              <a:t>measured</a:t>
             </a:r>
             <a:r>
               <a:rPr lang="fr-FR" dirty="0" smtClean="0"/>
-              <a:t> Alice </a:t>
+              <a:t> </a:t>
+            </a:r>
+            <a:r>
+              <a:rPr lang="fr-FR" dirty="0" err="1" smtClean="0"/>
+              <a:t>will</a:t>
+            </a:r>
+            <a:r>
+              <a:rPr lang="fr-FR" dirty="0" smtClean="0"/>
+              <a:t> </a:t>
+            </a:r>
+            <a:r>
+              <a:rPr lang="fr-FR" dirty="0" err="1" smtClean="0"/>
+              <a:t>be</a:t>
+            </a:r>
+            <a:r>
+              <a:rPr lang="fr-FR" dirty="0" smtClean="0"/>
+              <a:t> </a:t>
             </a:r>
             <a:r>
               <a:rPr lang="fr-FR" dirty="0" err="1" smtClean="0"/>
@@ -7192,447 +6939,110 @@
             </a:r>
             <a:r>
               <a:rPr lang="fr-FR" dirty="0" err="1" smtClean="0"/>
-              <a:t>polarize</a:t>
+              <a:t>form</a:t>
             </a:r>
             <a:r>
               <a:rPr lang="fr-FR" dirty="0" smtClean="0"/>
-              <a:t> a photon. </a:t>
-            </a:r>
-            <a:r>
-              <a:rPr lang="fr-FR" dirty="0" err="1" smtClean="0"/>
-              <a:t>Thus</a:t>
-            </a:r>
-            <a:r>
-              <a:rPr lang="fr-FR" dirty="0" smtClean="0"/>
-              <a:t>, </a:t>
-            </a:r>
-            <a:r>
-              <a:rPr lang="fr-FR" dirty="0" err="1" smtClean="0"/>
-              <a:t>she</a:t>
-            </a:r>
-            <a:r>
-              <a:rPr lang="fr-FR" dirty="0" smtClean="0"/>
-              <a:t> </a:t>
-            </a:r>
-            <a:r>
-              <a:rPr lang="fr-FR" dirty="0" err="1" smtClean="0"/>
-              <a:t>chooses</a:t>
-            </a:r>
-            <a:r>
-              <a:rPr lang="fr-FR" dirty="0" smtClean="0"/>
-              <a:t> a </a:t>
-            </a:r>
-            <a:r>
-              <a:rPr lang="fr-FR" dirty="0" err="1" smtClean="0"/>
-              <a:t>filter</a:t>
-            </a:r>
-            <a:r>
-              <a:rPr lang="fr-FR" dirty="0" smtClean="0"/>
-              <a:t> </a:t>
-            </a:r>
-            <a:r>
-              <a:rPr lang="fr-FR" dirty="0" err="1" smtClean="0"/>
-              <a:t>randomly</a:t>
-            </a:r>
-            <a:r>
-              <a:rPr lang="fr-FR" dirty="0" smtClean="0"/>
-              <a:t>. </a:t>
-            </a:r>
-            <a:r>
-              <a:rPr lang="fr-FR" dirty="0" err="1" smtClean="0"/>
-              <a:t>Two</a:t>
-            </a:r>
-            <a:r>
-              <a:rPr lang="fr-FR" dirty="0" smtClean="0"/>
-              <a:t> </a:t>
-            </a:r>
-            <a:r>
-              <a:rPr lang="fr-FR" dirty="0" err="1" smtClean="0"/>
-              <a:t>possibilities</a:t>
-            </a:r>
-            <a:r>
-              <a:rPr lang="fr-FR" dirty="0" smtClean="0"/>
-              <a:t> : </a:t>
-            </a:r>
-          </a:p>
-          <a:p>
-            <a:pPr lvl="1"/>
-            <a:r>
-              <a:rPr lang="fr-FR" dirty="0" err="1" smtClean="0"/>
-              <a:t>She</a:t>
-            </a:r>
-            <a:r>
-              <a:rPr lang="fr-FR" dirty="0" smtClean="0"/>
-              <a:t> </a:t>
-            </a:r>
-            <a:r>
-              <a:rPr lang="fr-FR" dirty="0" err="1" smtClean="0"/>
-              <a:t>chooses</a:t>
-            </a:r>
-            <a:r>
-              <a:rPr lang="fr-FR" dirty="0" smtClean="0"/>
-              <a:t> the correct </a:t>
-            </a:r>
-            <a:r>
-              <a:rPr lang="fr-FR" dirty="0" err="1" smtClean="0"/>
-              <a:t>filter</a:t>
-            </a:r>
-            <a:r>
-              <a:rPr lang="fr-FR" dirty="0" smtClean="0"/>
-              <a:t> (50% chance): </a:t>
-            </a:r>
-            <a:r>
-              <a:rPr lang="fr-FR" dirty="0" err="1" smtClean="0"/>
-              <a:t>she</a:t>
-            </a:r>
-            <a:r>
-              <a:rPr lang="fr-FR" dirty="0" smtClean="0"/>
-              <a:t> </a:t>
-            </a:r>
-            <a:r>
-              <a:rPr lang="fr-FR" dirty="0" err="1" smtClean="0"/>
-              <a:t>then</a:t>
-            </a:r>
-            <a:r>
-              <a:rPr lang="fr-FR" dirty="0" smtClean="0"/>
-              <a:t> </a:t>
-            </a:r>
-            <a:r>
-              <a:rPr lang="fr-FR" dirty="0" err="1" smtClean="0"/>
-              <a:t>resends</a:t>
-            </a:r>
-            <a:r>
-              <a:rPr lang="fr-FR" dirty="0" smtClean="0"/>
-              <a:t> the correct state to Bob (</a:t>
-            </a:r>
-            <a:r>
-              <a:rPr lang="fr-FR" dirty="0" err="1" smtClean="0"/>
-              <a:t>who</a:t>
-            </a:r>
-            <a:r>
-              <a:rPr lang="fr-FR" dirty="0" smtClean="0"/>
-              <a:t> </a:t>
-            </a:r>
-            <a:r>
-              <a:rPr lang="fr-FR" dirty="0" err="1" smtClean="0"/>
-              <a:t>won’t</a:t>
-            </a:r>
-            <a:r>
-              <a:rPr lang="fr-FR" dirty="0" smtClean="0"/>
-              <a:t> suspect a </a:t>
-            </a:r>
-            <a:r>
-              <a:rPr lang="fr-FR" dirty="0" err="1" smtClean="0"/>
-              <a:t>thing</a:t>
-            </a:r>
-            <a:r>
-              <a:rPr lang="fr-FR" dirty="0" smtClean="0"/>
-              <a:t>).</a:t>
-            </a:r>
-          </a:p>
-          <a:p>
-            <a:pPr lvl="1"/>
-            <a:r>
-              <a:rPr lang="fr-FR" dirty="0" err="1" smtClean="0"/>
-              <a:t>She</a:t>
-            </a:r>
-            <a:r>
-              <a:rPr lang="fr-FR" dirty="0" smtClean="0"/>
-              <a:t> </a:t>
-            </a:r>
-            <a:r>
-              <a:rPr lang="fr-FR" dirty="0" err="1" smtClean="0"/>
-              <a:t>chooses</a:t>
-            </a:r>
-            <a:r>
-              <a:rPr lang="fr-FR" dirty="0" smtClean="0"/>
-              <a:t> the </a:t>
-            </a:r>
-            <a:r>
-              <a:rPr lang="fr-FR" dirty="0" err="1" smtClean="0"/>
-              <a:t>wrong</a:t>
-            </a:r>
-            <a:r>
-              <a:rPr lang="fr-FR" dirty="0" smtClean="0"/>
-              <a:t> </a:t>
-            </a:r>
-            <a:r>
-              <a:rPr lang="fr-FR" dirty="0" err="1" smtClean="0"/>
-              <a:t>filter</a:t>
-            </a:r>
-            <a:r>
-              <a:rPr lang="fr-FR" dirty="0" smtClean="0"/>
-              <a:t> (50% chance): </a:t>
-            </a:r>
-            <a:r>
-              <a:rPr lang="fr-FR" dirty="0" err="1" smtClean="0"/>
-              <a:t>her</a:t>
-            </a:r>
-            <a:r>
-              <a:rPr lang="fr-FR" dirty="0" smtClean="0"/>
-              <a:t> bit </a:t>
-            </a:r>
-            <a:r>
-              <a:rPr lang="fr-FR" dirty="0" err="1" smtClean="0"/>
-              <a:t>measurement</a:t>
-            </a:r>
-            <a:r>
-              <a:rPr lang="fr-FR" dirty="0" smtClean="0"/>
-              <a:t> </a:t>
-            </a:r>
-            <a:r>
-              <a:rPr lang="fr-FR" dirty="0" err="1" smtClean="0"/>
-              <a:t>is</a:t>
-            </a:r>
-            <a:r>
-              <a:rPr lang="fr-FR" dirty="0" smtClean="0"/>
-              <a:t> </a:t>
-            </a:r>
-            <a:r>
-              <a:rPr lang="fr-FR" dirty="0" err="1" smtClean="0"/>
-              <a:t>random</a:t>
-            </a:r>
-            <a:r>
-              <a:rPr lang="fr-FR" dirty="0" smtClean="0"/>
-              <a:t>, and the state of the photon </a:t>
-            </a:r>
-            <a:r>
-              <a:rPr lang="fr-FR" dirty="0" err="1" smtClean="0"/>
-              <a:t>she</a:t>
-            </a:r>
-            <a:r>
-              <a:rPr lang="fr-FR" dirty="0" smtClean="0"/>
-              <a:t> </a:t>
-            </a:r>
-            <a:r>
-              <a:rPr lang="fr-FR" dirty="0" err="1" smtClean="0"/>
-              <a:t>resends</a:t>
-            </a:r>
-            <a:r>
-              <a:rPr lang="fr-FR" dirty="0" smtClean="0"/>
-              <a:t> to Bob </a:t>
-            </a:r>
-            <a:r>
-              <a:rPr lang="fr-FR" dirty="0" err="1" smtClean="0"/>
-              <a:t>cannot</a:t>
-            </a:r>
-            <a:r>
-              <a:rPr lang="fr-FR" dirty="0" smtClean="0"/>
-              <a:t> </a:t>
-            </a:r>
-            <a:r>
-              <a:rPr lang="fr-FR" dirty="0" err="1" smtClean="0"/>
-              <a:t>be</a:t>
-            </a:r>
-            <a:r>
-              <a:rPr lang="fr-FR" dirty="0" smtClean="0"/>
-              <a:t> the </a:t>
-            </a:r>
-            <a:r>
-              <a:rPr lang="fr-FR" dirty="0" err="1" smtClean="0"/>
-              <a:t>same</a:t>
-            </a:r>
-            <a:r>
-              <a:rPr lang="fr-FR" dirty="0" smtClean="0"/>
-              <a:t> as the state sent by Alice. If Bob </a:t>
-            </a:r>
-            <a:r>
-              <a:rPr lang="fr-FR" dirty="0" err="1" smtClean="0"/>
-              <a:t>chooses</a:t>
-            </a:r>
-            <a:r>
-              <a:rPr lang="fr-FR" dirty="0" smtClean="0"/>
-              <a:t> the </a:t>
-            </a:r>
-            <a:r>
-              <a:rPr lang="fr-FR" dirty="0" err="1" smtClean="0"/>
-              <a:t>same</a:t>
-            </a:r>
-            <a:r>
-              <a:rPr lang="fr-FR" dirty="0" smtClean="0"/>
-              <a:t> </a:t>
-            </a:r>
-            <a:r>
-              <a:rPr lang="fr-FR" dirty="0" err="1" smtClean="0"/>
-              <a:t>filter</a:t>
-            </a:r>
-            <a:r>
-              <a:rPr lang="fr-FR" dirty="0" smtClean="0"/>
-              <a:t> as Alice, </a:t>
-            </a:r>
-            <a:r>
-              <a:rPr lang="fr-FR" dirty="0" err="1" smtClean="0"/>
-              <a:t>his</a:t>
-            </a:r>
-            <a:r>
-              <a:rPr lang="fr-FR" dirty="0" smtClean="0"/>
-              <a:t> bit </a:t>
-            </a:r>
-            <a:r>
-              <a:rPr lang="fr-FR" dirty="0" err="1" smtClean="0"/>
-              <a:t>measurement</a:t>
-            </a:r>
-            <a:r>
-              <a:rPr lang="fr-FR" dirty="0" smtClean="0"/>
-              <a:t> </a:t>
-            </a:r>
-            <a:r>
-              <a:rPr lang="fr-FR" dirty="0" err="1" smtClean="0"/>
-              <a:t>will</a:t>
-            </a:r>
-            <a:r>
-              <a:rPr lang="fr-FR" dirty="0" smtClean="0"/>
-              <a:t> </a:t>
-            </a:r>
-            <a:r>
-              <a:rPr lang="fr-FR" dirty="0" err="1" smtClean="0"/>
-              <a:t>be</a:t>
-            </a:r>
-            <a:r>
-              <a:rPr lang="fr-FR" dirty="0" smtClean="0"/>
-              <a:t> </a:t>
-            </a:r>
-            <a:r>
-              <a:rPr lang="fr-FR" dirty="0" err="1" smtClean="0"/>
-              <a:t>random</a:t>
-            </a:r>
-            <a:r>
-              <a:rPr lang="fr-FR" dirty="0" smtClean="0"/>
-              <a:t> </a:t>
-            </a:r>
-            <a:r>
-              <a:rPr lang="fr-FR" dirty="0" err="1" smtClean="0"/>
-              <a:t>too</a:t>
-            </a:r>
-            <a:r>
-              <a:rPr lang="fr-FR" dirty="0" smtClean="0"/>
-              <a:t> (50% chance of </a:t>
-            </a:r>
-            <a:r>
-              <a:rPr lang="fr-FR" dirty="0" err="1" smtClean="0"/>
-              <a:t>being</a:t>
-            </a:r>
-            <a:r>
-              <a:rPr lang="fr-FR" dirty="0" smtClean="0"/>
-              <a:t> </a:t>
-            </a:r>
-            <a:r>
-              <a:rPr lang="fr-FR" dirty="0" err="1" smtClean="0"/>
-              <a:t>wrong</a:t>
-            </a:r>
-            <a:r>
-              <a:rPr lang="fr-FR" dirty="0" smtClean="0"/>
-              <a:t>).</a:t>
-            </a:r>
-          </a:p>
-          <a:p>
-            <a:r>
-              <a:rPr lang="fr-FR" dirty="0" smtClean="0"/>
-              <a:t>The </a:t>
-            </a:r>
-            <a:r>
-              <a:rPr lang="fr-FR" dirty="0" err="1" smtClean="0"/>
-              <a:t>probability</a:t>
-            </a:r>
-            <a:r>
-              <a:rPr lang="fr-FR" dirty="0" smtClean="0"/>
-              <a:t> an </a:t>
-            </a:r>
-            <a:r>
-              <a:rPr lang="fr-FR" dirty="0" err="1" smtClean="0"/>
-              <a:t>intercepted</a:t>
-            </a:r>
-            <a:r>
-              <a:rPr lang="fr-FR" dirty="0" smtClean="0"/>
-              <a:t> photon </a:t>
-            </a:r>
-            <a:r>
-              <a:rPr lang="fr-FR" dirty="0" err="1" smtClean="0"/>
-              <a:t>generates</a:t>
-            </a:r>
-            <a:r>
-              <a:rPr lang="fr-FR" dirty="0" smtClean="0"/>
-              <a:t> an </a:t>
-            </a:r>
-            <a:r>
-              <a:rPr lang="fr-FR" dirty="0" err="1" smtClean="0"/>
-              <a:t>error</a:t>
-            </a:r>
-            <a:r>
-              <a:rPr lang="fr-FR" dirty="0" smtClean="0"/>
-              <a:t> in the key </a:t>
-            </a:r>
-            <a:r>
-              <a:rPr lang="fr-FR" dirty="0" err="1" smtClean="0"/>
-              <a:t>equals</a:t>
-            </a:r>
-            <a:r>
-              <a:rPr lang="fr-FR" dirty="0" smtClean="0"/>
-              <a:t> 50% (Eve </a:t>
-            </a:r>
-            <a:r>
-              <a:rPr lang="fr-FR" dirty="0" err="1" smtClean="0"/>
-              <a:t>choosing</a:t>
-            </a:r>
-            <a:r>
-              <a:rPr lang="fr-FR" dirty="0" smtClean="0"/>
-              <a:t> the </a:t>
-            </a:r>
-            <a:r>
-              <a:rPr lang="fr-FR" dirty="0" err="1" smtClean="0"/>
-              <a:t>wrong</a:t>
-            </a:r>
-            <a:r>
-              <a:rPr lang="fr-FR" dirty="0" smtClean="0"/>
-              <a:t> </a:t>
-            </a:r>
-            <a:r>
-              <a:rPr lang="fr-FR" dirty="0" err="1" smtClean="0"/>
-              <a:t>filter</a:t>
-            </a:r>
-            <a:r>
-              <a:rPr lang="fr-FR" dirty="0" smtClean="0"/>
-              <a:t>) x 50% (</a:t>
-            </a:r>
-            <a:r>
-              <a:rPr lang="fr-FR" dirty="0" err="1" smtClean="0"/>
-              <a:t>Bob’s</a:t>
-            </a:r>
-            <a:r>
-              <a:rPr lang="fr-FR" dirty="0" smtClean="0"/>
-              <a:t> bit </a:t>
-            </a:r>
-            <a:r>
-              <a:rPr lang="fr-FR" dirty="0" err="1" smtClean="0"/>
-              <a:t>measurement</a:t>
-            </a:r>
-            <a:r>
-              <a:rPr lang="fr-FR" dirty="0" smtClean="0"/>
-              <a:t> </a:t>
-            </a:r>
-            <a:r>
-              <a:rPr lang="fr-FR" dirty="0" err="1" smtClean="0"/>
-              <a:t>being</a:t>
-            </a:r>
-            <a:r>
-              <a:rPr lang="fr-FR" dirty="0" smtClean="0"/>
-              <a:t> </a:t>
-            </a:r>
-            <a:r>
-              <a:rPr lang="fr-FR" dirty="0" err="1" smtClean="0"/>
-              <a:t>wrong</a:t>
-            </a:r>
-            <a:r>
-              <a:rPr lang="fr-FR" dirty="0" smtClean="0"/>
-              <a:t>) = 25%</a:t>
-            </a:r>
-          </a:p>
-        </p:txBody>
-      </p:sp>
+              <a:t> the key.</a:t>
+            </a:r>
+            <a:endParaRPr lang="fr-FR" dirty="0"/>
+          </a:p>
+        </p:txBody>
+      </p:sp>
+      <p:pic>
+        <p:nvPicPr>
+          <p:cNvPr id="6" name="Image 5"/>
+          <p:cNvPicPr>
+            <a:picLocks noChangeAspect="1"/>
+          </p:cNvPicPr>
+          <p:nvPr/>
+        </p:nvPicPr>
+        <p:blipFill>
+          <a:blip r:embed="rId2">
+            <a:extLst>
+              <a:ext uri="{28A0092B-C50C-407E-A947-70E740481C1C}">
+                <a14:useLocalDpi xmlns:a14="http://schemas.microsoft.com/office/drawing/2010/main" val="0"/>
+              </a:ext>
+            </a:extLst>
+          </a:blip>
+          <a:stretch>
+            <a:fillRect/>
+          </a:stretch>
+        </p:blipFill>
+        <p:spPr>
+          <a:xfrm>
+            <a:off x="1772267" y="229923"/>
+            <a:ext cx="634921" cy="1269841"/>
+          </a:xfrm>
+          <a:prstGeom prst="rect">
+            <a:avLst/>
+          </a:prstGeom>
+        </p:spPr>
+      </p:pic>
+      <p:pic>
+        <p:nvPicPr>
+          <p:cNvPr id="7" name="Image 6"/>
+          <p:cNvPicPr>
+            <a:picLocks noChangeAspect="1"/>
+          </p:cNvPicPr>
+          <p:nvPr/>
+        </p:nvPicPr>
+        <p:blipFill>
+          <a:blip r:embed="rId3">
+            <a:extLst>
+              <a:ext uri="{28A0092B-C50C-407E-A947-70E740481C1C}">
+                <a14:useLocalDpi xmlns:a14="http://schemas.microsoft.com/office/drawing/2010/main" val="0"/>
+              </a:ext>
+            </a:extLst>
+          </a:blip>
+          <a:stretch>
+            <a:fillRect/>
+          </a:stretch>
+        </p:blipFill>
+        <p:spPr>
+          <a:xfrm>
+            <a:off x="10875981" y="1641429"/>
+            <a:ext cx="634921" cy="1269841"/>
+          </a:xfrm>
+          <a:prstGeom prst="rect">
+            <a:avLst/>
+          </a:prstGeom>
+        </p:spPr>
+      </p:pic>
+      <p:pic>
+        <p:nvPicPr>
+          <p:cNvPr id="12" name="Image 11"/>
+          <p:cNvPicPr>
+            <a:picLocks noChangeAspect="1"/>
+          </p:cNvPicPr>
+          <p:nvPr/>
+        </p:nvPicPr>
+        <p:blipFill>
+          <a:blip r:embed="rId4">
+            <a:extLst>
+              <a:ext uri="{28A0092B-C50C-407E-A947-70E740481C1C}">
+                <a14:useLocalDpi xmlns:a14="http://schemas.microsoft.com/office/drawing/2010/main" val="0"/>
+              </a:ext>
+            </a:extLst>
+          </a:blip>
+          <a:stretch>
+            <a:fillRect/>
+          </a:stretch>
+        </p:blipFill>
+        <p:spPr>
+          <a:xfrm>
+            <a:off x="2832061" y="3181729"/>
+            <a:ext cx="7619047" cy="3225397"/>
+          </a:xfrm>
+          <a:prstGeom prst="rect">
+            <a:avLst/>
+          </a:prstGeom>
+        </p:spPr>
+      </p:pic>
     </p:spTree>
     <p:extLst>
       <p:ext uri="{BB962C8B-B14F-4D97-AF65-F5344CB8AC3E}">
-        <p14:creationId xmlns:p14="http://schemas.microsoft.com/office/powerpoint/2010/main" val="1399650278"/>
+        <p14:creationId xmlns:p14="http://schemas.microsoft.com/office/powerpoint/2010/main" val="802653970"/>
       </p:ext>
     </p:extLst>
   </p:cSld>
@@ -7678,7 +7088,494 @@
         </p:nvSpPr>
         <p:spPr>
           <a:xfrm>
-            <a:off x="1484310" y="0"/>
+            <a:off x="1484309" y="209281"/>
+            <a:ext cx="10018713" cy="1752599"/>
+          </a:xfrm>
+        </p:spPr>
+        <p:txBody>
+          <a:bodyPr/>
+          <a:lstStyle/>
+          <a:p>
+            <a:r>
+              <a:rPr lang="fr-FR" dirty="0" err="1" smtClean="0"/>
+              <a:t>What</a:t>
+            </a:r>
+            <a:r>
+              <a:rPr lang="fr-FR" dirty="0" smtClean="0"/>
+              <a:t> if </a:t>
+            </a:r>
+            <a:r>
+              <a:rPr lang="fr-FR" dirty="0" err="1" smtClean="0"/>
+              <a:t>someone</a:t>
+            </a:r>
+            <a:r>
+              <a:rPr lang="fr-FR" dirty="0" smtClean="0"/>
+              <a:t> </a:t>
+            </a:r>
+            <a:r>
+              <a:rPr lang="fr-FR" dirty="0" err="1" smtClean="0"/>
+              <a:t>is</a:t>
+            </a:r>
+            <a:r>
+              <a:rPr lang="fr-FR" dirty="0" smtClean="0"/>
+              <a:t> </a:t>
+            </a:r>
+            <a:r>
+              <a:rPr lang="fr-FR" dirty="0" err="1" smtClean="0"/>
+              <a:t>trying</a:t>
+            </a:r>
+            <a:r>
+              <a:rPr lang="fr-FR" dirty="0" smtClean="0"/>
+              <a:t> to </a:t>
+            </a:r>
+            <a:r>
+              <a:rPr lang="fr-FR" dirty="0" err="1" smtClean="0"/>
+              <a:t>eavesdrop</a:t>
+            </a:r>
+            <a:r>
+              <a:rPr lang="fr-FR" dirty="0" smtClean="0"/>
+              <a:t> on Alice and Bob?</a:t>
+            </a:r>
+            <a:endParaRPr lang="fr-FR" dirty="0"/>
+          </a:p>
+        </p:txBody>
+      </p:sp>
+      <mc:AlternateContent xmlns:mc="http://schemas.openxmlformats.org/markup-compatibility/2006">
+        <mc:Choice xmlns:a14="http://schemas.microsoft.com/office/drawing/2010/main" Requires="a14">
+          <p:sp>
+            <p:nvSpPr>
+              <p:cNvPr id="3" name="Espace réservé du contenu 2"/>
+              <p:cNvSpPr>
+                <a:spLocks noGrp="1"/>
+              </p:cNvSpPr>
+              <p:nvPr>
+                <p:ph idx="1"/>
+              </p:nvPr>
+            </p:nvSpPr>
+            <p:spPr/>
+            <p:txBody>
+              <a:bodyPr>
+                <a:normAutofit fontScale="92500" lnSpcReduction="20000"/>
+              </a:bodyPr>
+              <a:lstStyle/>
+              <a:p>
+                <a:r>
+                  <a:rPr lang="fr-FR" dirty="0" smtClean="0"/>
+                  <a:t>Eve the </a:t>
+                </a:r>
+                <a:r>
+                  <a:rPr lang="fr-FR" dirty="0" err="1" smtClean="0"/>
+                  <a:t>eavesdropper</a:t>
+                </a:r>
+                <a:r>
+                  <a:rPr lang="fr-FR" dirty="0" smtClean="0"/>
+                  <a:t> has </a:t>
+                </a:r>
+                <a:r>
+                  <a:rPr lang="fr-FR" dirty="0" err="1" smtClean="0"/>
+                  <a:t>only</a:t>
+                </a:r>
+                <a:r>
+                  <a:rPr lang="fr-FR" dirty="0" smtClean="0"/>
+                  <a:t> </a:t>
+                </a:r>
+                <a:r>
+                  <a:rPr lang="fr-FR" dirty="0" err="1" smtClean="0"/>
+                  <a:t>rectilinear</a:t>
+                </a:r>
+                <a:r>
+                  <a:rPr lang="fr-FR" dirty="0" smtClean="0"/>
+                  <a:t> and diagonal </a:t>
+                </a:r>
+                <a:r>
+                  <a:rPr lang="fr-FR" dirty="0" err="1" smtClean="0"/>
+                  <a:t>filters</a:t>
+                </a:r>
+                <a:r>
+                  <a:rPr lang="fr-FR" dirty="0"/>
+                  <a:t> </a:t>
+                </a:r>
+                <a:r>
+                  <a:rPr lang="fr-FR" dirty="0" smtClean="0"/>
+                  <a:t>and </a:t>
+                </a:r>
+                <a:r>
+                  <a:rPr lang="fr-FR" dirty="0" err="1" smtClean="0"/>
+                  <a:t>does</a:t>
+                </a:r>
+                <a:r>
+                  <a:rPr lang="fr-FR" dirty="0" smtClean="0"/>
+                  <a:t> not know </a:t>
+                </a:r>
+                <a:r>
+                  <a:rPr lang="fr-FR" dirty="0" err="1" smtClean="0"/>
+                  <a:t>which</a:t>
+                </a:r>
+                <a:r>
+                  <a:rPr lang="fr-FR" dirty="0" smtClean="0"/>
+                  <a:t> </a:t>
+                </a:r>
+                <a:r>
+                  <a:rPr lang="fr-FR" dirty="0" err="1" smtClean="0"/>
+                  <a:t>filter</a:t>
+                </a:r>
+                <a:r>
+                  <a:rPr lang="fr-FR" dirty="0" smtClean="0"/>
+                  <a:t> Alice </a:t>
+                </a:r>
+                <a:r>
+                  <a:rPr lang="fr-FR" dirty="0" err="1" smtClean="0"/>
+                  <a:t>used</a:t>
+                </a:r>
+                <a:r>
+                  <a:rPr lang="fr-FR" dirty="0" smtClean="0"/>
+                  <a:t> to </a:t>
+                </a:r>
+                <a:r>
+                  <a:rPr lang="fr-FR" dirty="0" err="1" smtClean="0"/>
+                  <a:t>polarize</a:t>
+                </a:r>
+                <a:r>
+                  <a:rPr lang="fr-FR" dirty="0" smtClean="0"/>
+                  <a:t> a </a:t>
+                </a:r>
+                <a:r>
+                  <a:rPr lang="fr-FR" dirty="0" smtClean="0"/>
+                  <a:t>photon. </a:t>
+                </a:r>
+                <a:r>
+                  <a:rPr lang="fr-FR" dirty="0" err="1" smtClean="0"/>
+                  <a:t>She</a:t>
+                </a:r>
+                <a:r>
+                  <a:rPr lang="fr-FR" dirty="0" smtClean="0"/>
+                  <a:t> </a:t>
+                </a:r>
+                <a:r>
+                  <a:rPr lang="fr-FR" dirty="0" err="1" smtClean="0"/>
+                  <a:t>randomly</a:t>
+                </a:r>
+                <a:r>
+                  <a:rPr lang="fr-FR" dirty="0" smtClean="0"/>
+                  <a:t> </a:t>
+                </a:r>
+                <a:r>
+                  <a:rPr lang="fr-FR" dirty="0" err="1" smtClean="0"/>
+                  <a:t>chooses</a:t>
+                </a:r>
+                <a:r>
+                  <a:rPr lang="fr-FR" dirty="0" smtClean="0"/>
+                  <a:t> one </a:t>
+                </a:r>
+                <a:r>
+                  <a:rPr lang="fr-FR" dirty="0" err="1" smtClean="0"/>
+                  <a:t>filter</a:t>
+                </a:r>
+                <a:r>
+                  <a:rPr lang="fr-FR" dirty="0" smtClean="0"/>
+                  <a:t>: </a:t>
+                </a:r>
+                <a:endParaRPr lang="fr-FR" dirty="0" smtClean="0"/>
+              </a:p>
+              <a:p>
+                <a:pPr lvl="1"/>
+                <a:r>
+                  <a:rPr lang="fr-FR" dirty="0" err="1" smtClean="0"/>
+                  <a:t>She</a:t>
+                </a:r>
+                <a:r>
+                  <a:rPr lang="fr-FR" dirty="0" smtClean="0"/>
+                  <a:t> </a:t>
+                </a:r>
+                <a:r>
+                  <a:rPr lang="fr-FR" dirty="0" err="1" smtClean="0"/>
+                  <a:t>chooses</a:t>
+                </a:r>
+                <a:r>
+                  <a:rPr lang="fr-FR" dirty="0" smtClean="0"/>
+                  <a:t> the correct </a:t>
+                </a:r>
+                <a:r>
+                  <a:rPr lang="fr-FR" dirty="0" err="1" smtClean="0"/>
+                  <a:t>filter</a:t>
+                </a:r>
+                <a:r>
+                  <a:rPr lang="fr-FR" dirty="0" smtClean="0"/>
+                  <a:t> (50% </a:t>
+                </a:r>
+                <a:r>
+                  <a:rPr lang="fr-FR" dirty="0" smtClean="0"/>
+                  <a:t>chance)</a:t>
+                </a:r>
+              </a:p>
+              <a:p>
+                <a:pPr lvl="1"/>
+                <a:r>
+                  <a:rPr lang="fr-FR" dirty="0" err="1" smtClean="0"/>
+                  <a:t>She</a:t>
+                </a:r>
+                <a:r>
+                  <a:rPr lang="fr-FR" dirty="0" smtClean="0"/>
+                  <a:t> </a:t>
+                </a:r>
+                <a:r>
+                  <a:rPr lang="fr-FR" dirty="0" err="1" smtClean="0"/>
+                  <a:t>chooses</a:t>
+                </a:r>
+                <a:r>
+                  <a:rPr lang="fr-FR" dirty="0" smtClean="0"/>
+                  <a:t> the </a:t>
+                </a:r>
+                <a:r>
+                  <a:rPr lang="fr-FR" dirty="0" err="1" smtClean="0"/>
+                  <a:t>wrong</a:t>
+                </a:r>
+                <a:r>
+                  <a:rPr lang="fr-FR" dirty="0" smtClean="0"/>
+                  <a:t> </a:t>
+                </a:r>
+                <a:r>
+                  <a:rPr lang="fr-FR" dirty="0" err="1" smtClean="0"/>
+                  <a:t>filter</a:t>
+                </a:r>
+                <a:r>
+                  <a:rPr lang="fr-FR" dirty="0" smtClean="0"/>
+                  <a:t> (50% </a:t>
+                </a:r>
+                <a:r>
+                  <a:rPr lang="fr-FR" dirty="0" smtClean="0"/>
+                  <a:t>chance)</a:t>
+                </a:r>
+                <a:endParaRPr lang="fr-FR" dirty="0" smtClean="0"/>
+              </a:p>
+              <a:p>
+                <a:pPr lvl="1"/>
+                <a:endParaRPr lang="fr-FR" dirty="0" smtClean="0"/>
+              </a:p>
+              <a:p>
+                <a:r>
+                  <a:rPr lang="fr-FR" dirty="0" smtClean="0"/>
+                  <a:t>The </a:t>
+                </a:r>
+                <a:r>
+                  <a:rPr lang="fr-FR" dirty="0" err="1" smtClean="0"/>
+                  <a:t>probability</a:t>
+                </a:r>
+                <a:r>
+                  <a:rPr lang="fr-FR" dirty="0" smtClean="0"/>
+                  <a:t> an </a:t>
+                </a:r>
+                <a:r>
+                  <a:rPr lang="fr-FR" dirty="0" err="1" smtClean="0"/>
+                  <a:t>intercepted</a:t>
+                </a:r>
+                <a:r>
+                  <a:rPr lang="fr-FR" dirty="0" smtClean="0"/>
+                  <a:t> photon </a:t>
+                </a:r>
+                <a:r>
+                  <a:rPr lang="fr-FR" dirty="0" err="1" smtClean="0"/>
+                  <a:t>generates</a:t>
+                </a:r>
+                <a:r>
+                  <a:rPr lang="fr-FR" dirty="0" smtClean="0"/>
+                  <a:t> an </a:t>
+                </a:r>
+                <a:r>
+                  <a:rPr lang="fr-FR" dirty="0" err="1" smtClean="0"/>
+                  <a:t>error</a:t>
+                </a:r>
+                <a:r>
+                  <a:rPr lang="fr-FR" dirty="0" smtClean="0"/>
+                  <a:t> in the key </a:t>
+                </a:r>
+                <a:r>
+                  <a:rPr lang="fr-FR" dirty="0" err="1" smtClean="0"/>
+                  <a:t>equals</a:t>
+                </a:r>
+                <a:r>
+                  <a:rPr lang="fr-FR" dirty="0" smtClean="0"/>
+                  <a:t> :</a:t>
+                </a:r>
+              </a:p>
+              <a:p>
+                <a:pPr marL="0" indent="0" algn="ctr">
+                  <a:buNone/>
+                </a:pPr>
+                <a14:m>
+                  <m:oMath xmlns:m="http://schemas.openxmlformats.org/officeDocument/2006/math">
+                    <m:r>
+                      <a:rPr lang="fr-FR" b="0" i="1" smtClean="0">
+                        <a:latin typeface="Cambria Math" panose="02040503050406030204" pitchFamily="18" charset="0"/>
+                      </a:rPr>
+                      <m:t>50% ∗50%=25%</m:t>
+                    </m:r>
+                  </m:oMath>
+                </a14:m>
+                <a:r>
+                  <a:rPr lang="fr-FR" dirty="0" smtClean="0"/>
+                  <a:t> </a:t>
+                </a:r>
+              </a:p>
+              <a:p>
+                <a:pPr marL="0" indent="0" algn="ctr">
+                  <a:buNone/>
+                </a:pPr>
+                <a:r>
+                  <a:rPr lang="fr-FR" sz="1900" dirty="0" smtClean="0"/>
+                  <a:t>(Eve </a:t>
+                </a:r>
+                <a:r>
+                  <a:rPr lang="fr-FR" sz="1900" dirty="0" err="1" smtClean="0"/>
+                  <a:t>choosing</a:t>
+                </a:r>
+                <a:r>
+                  <a:rPr lang="fr-FR" sz="1900" dirty="0" smtClean="0"/>
+                  <a:t> the </a:t>
+                </a:r>
+                <a:r>
+                  <a:rPr lang="fr-FR" sz="1900" dirty="0" err="1" smtClean="0"/>
+                  <a:t>wrong</a:t>
+                </a:r>
+                <a:r>
+                  <a:rPr lang="fr-FR" sz="1900" dirty="0" smtClean="0"/>
+                  <a:t> </a:t>
+                </a:r>
+                <a:r>
+                  <a:rPr lang="fr-FR" sz="1900" dirty="0" err="1" smtClean="0"/>
+                  <a:t>filter</a:t>
+                </a:r>
+                <a:r>
+                  <a:rPr lang="fr-FR" sz="1900" dirty="0" smtClean="0"/>
+                  <a:t> X </a:t>
+                </a:r>
+                <a:r>
+                  <a:rPr lang="fr-FR" sz="1900" dirty="0" err="1" smtClean="0"/>
+                  <a:t>Bob’s</a:t>
+                </a:r>
+                <a:r>
+                  <a:rPr lang="fr-FR" sz="1900" dirty="0" smtClean="0"/>
+                  <a:t> bit </a:t>
+                </a:r>
+                <a:r>
+                  <a:rPr lang="fr-FR" sz="1900" dirty="0" err="1" smtClean="0"/>
+                  <a:t>measurement</a:t>
+                </a:r>
+                <a:r>
+                  <a:rPr lang="fr-FR" sz="1900" dirty="0" smtClean="0"/>
+                  <a:t> </a:t>
+                </a:r>
+                <a:r>
+                  <a:rPr lang="fr-FR" sz="1900" dirty="0" err="1" smtClean="0"/>
+                  <a:t>being</a:t>
+                </a:r>
+                <a:r>
+                  <a:rPr lang="fr-FR" sz="1900" dirty="0" smtClean="0"/>
+                  <a:t> </a:t>
+                </a:r>
+                <a:r>
+                  <a:rPr lang="fr-FR" sz="1900" dirty="0" err="1" smtClean="0"/>
+                  <a:t>wrong</a:t>
+                </a:r>
+                <a:r>
+                  <a:rPr lang="fr-FR" sz="1900" dirty="0" smtClean="0"/>
+                  <a:t>)</a:t>
+                </a:r>
+                <a:endParaRPr lang="fr-FR" sz="1900" dirty="0" smtClean="0"/>
+              </a:p>
+              <a:p>
+                <a:pPr marL="0" indent="0">
+                  <a:buNone/>
+                </a:pPr>
+                <a:endParaRPr lang="fr-FR" dirty="0" smtClean="0"/>
+              </a:p>
+            </p:txBody>
+          </p:sp>
+        </mc:Choice>
+        <mc:Fallback>
+          <p:sp>
+            <p:nvSpPr>
+              <p:cNvPr id="3" name="Espace réservé du contenu 2"/>
+              <p:cNvSpPr>
+                <a:spLocks noGrp="1" noRot="1" noChangeAspect="1" noMove="1" noResize="1" noEditPoints="1" noAdjustHandles="1" noChangeArrowheads="1" noChangeShapeType="1" noTextEdit="1"/>
+              </p:cNvSpPr>
+              <p:nvPr>
+                <p:ph idx="1"/>
+              </p:nvPr>
+            </p:nvSpPr>
+            <p:spPr>
+              <a:blipFill rotWithShape="0">
+                <a:blip r:embed="rId2"/>
+                <a:stretch>
+                  <a:fillRect l="-1338" t="-10331"/>
+                </a:stretch>
+              </a:blipFill>
+            </p:spPr>
+            <p:txBody>
+              <a:bodyPr/>
+              <a:lstStyle/>
+              <a:p>
+                <a:r>
+                  <a:rPr lang="fr-FR">
+                    <a:noFill/>
+                  </a:rPr>
+                  <a:t> </a:t>
+                </a:r>
+              </a:p>
+            </p:txBody>
+          </p:sp>
+        </mc:Fallback>
+      </mc:AlternateContent>
+    </p:spTree>
+    <p:extLst>
+      <p:ext uri="{BB962C8B-B14F-4D97-AF65-F5344CB8AC3E}">
+        <p14:creationId xmlns:p14="http://schemas.microsoft.com/office/powerpoint/2010/main" val="1399650278"/>
+      </p:ext>
+    </p:extLst>
+  </p:cSld>
+  <p:clrMapOvr>
+    <a:masterClrMapping/>
+  </p:clrMapOvr>
+  <p:timing>
+    <p:tnLst>
+      <p:par>
+        <p:cTn id="1" dur="indefinite" restart="never" nodeType="tmRoot"/>
+      </p:par>
+    </p:tnLst>
+  </p:timing>
+</p:sld>
+</file>
+
+<file path=ppt/slides/slide6.xml><?xml version="1.0" encoding="utf-8"?>
+<p:sld xmlns:a="http://schemas.openxmlformats.org/drawingml/2006/main" xmlns:r="http://schemas.openxmlformats.org/officeDocument/2006/relationships" xmlns:p="http://schemas.openxmlformats.org/presentationml/2006/main">
+  <p:cSld>
+    <p:spTree>
+      <p:nvGrpSpPr>
+        <p:cNvPr id="1" name=""/>
+        <p:cNvGrpSpPr/>
+        <p:nvPr/>
+      </p:nvGrpSpPr>
+      <p:grpSpPr>
+        <a:xfrm>
+          <a:off x="0" y="0"/>
+          <a:ext cx="0" cy="0"/>
+          <a:chOff x="0" y="0"/>
+          <a:chExt cx="0" cy="0"/>
+        </a:xfrm>
+      </p:grpSpPr>
+      <p:sp>
+        <p:nvSpPr>
+          <p:cNvPr id="2" name="Titre 1"/>
+          <p:cNvSpPr>
+            <a:spLocks noGrp="1"/>
+          </p:cNvSpPr>
+          <p:nvPr>
+            <p:ph type="title"/>
+          </p:nvPr>
+        </p:nvSpPr>
+        <p:spPr>
+          <a:xfrm>
+            <a:off x="1484310" y="204990"/>
             <a:ext cx="10018713" cy="1752599"/>
           </a:xfrm>
         </p:spPr>
@@ -7746,7 +7643,7 @@
             </p:spPr>
             <p:txBody>
               <a:bodyPr>
-                <a:normAutofit fontScale="92500" lnSpcReduction="20000"/>
+                <a:normAutofit lnSpcReduction="10000"/>
               </a:bodyPr>
               <a:lstStyle/>
               <a:p>
@@ -7869,74 +7766,7 @@
                   <a:rPr lang="fr-FR" dirty="0" err="1" smtClean="0"/>
                   <a:t>found</a:t>
                 </a:r>
-                <a:r>
-                  <a:rPr lang="fr-FR" dirty="0" smtClean="0"/>
-                  <a:t>: the key </a:t>
-                </a:r>
-                <a:r>
-                  <a:rPr lang="fr-FR" dirty="0" err="1" smtClean="0"/>
-                  <a:t>is</a:t>
-                </a:r>
-                <a:r>
-                  <a:rPr lang="fr-FR" dirty="0" smtClean="0"/>
-                  <a:t> </a:t>
-                </a:r>
-                <a:r>
-                  <a:rPr lang="fr-FR" dirty="0" err="1" smtClean="0"/>
-                  <a:t>secured</a:t>
-                </a:r>
-                <a:r>
-                  <a:rPr lang="fr-FR" dirty="0" smtClean="0"/>
-                  <a:t> OR the </a:t>
-                </a:r>
-                <a:r>
-                  <a:rPr lang="fr-FR" dirty="0" err="1" smtClean="0"/>
-                  <a:t>number</a:t>
-                </a:r>
-                <a:r>
-                  <a:rPr lang="fr-FR" dirty="0" smtClean="0"/>
-                  <a:t> of bits </a:t>
-                </a:r>
-                <a:r>
-                  <a:rPr lang="fr-FR" dirty="0" err="1" smtClean="0"/>
-                  <a:t>sacrificed</a:t>
-                </a:r>
-                <a:r>
-                  <a:rPr lang="fr-FR" dirty="0" smtClean="0"/>
-                  <a:t> </a:t>
-                </a:r>
-                <a:r>
-                  <a:rPr lang="fr-FR" dirty="0" err="1" smtClean="0"/>
-                  <a:t>was</a:t>
-                </a:r>
-                <a:r>
-                  <a:rPr lang="fr-FR" dirty="0" smtClean="0"/>
-                  <a:t> </a:t>
-                </a:r>
-                <a:r>
-                  <a:rPr lang="fr-FR" dirty="0" err="1" smtClean="0"/>
-                  <a:t>too</a:t>
-                </a:r>
-                <a:r>
-                  <a:rPr lang="fr-FR" dirty="0" smtClean="0"/>
-                  <a:t> </a:t>
-                </a:r>
-                <a:r>
-                  <a:rPr lang="fr-FR" dirty="0" err="1" smtClean="0"/>
-                  <a:t>small</a:t>
-                </a:r>
-                <a:r>
-                  <a:rPr lang="fr-FR" dirty="0" smtClean="0"/>
-                  <a:t> to </a:t>
-                </a:r>
-                <a:r>
-                  <a:rPr lang="fr-FR" dirty="0" err="1" smtClean="0"/>
-                  <a:t>detect</a:t>
-                </a:r>
-                <a:r>
-                  <a:rPr lang="fr-FR" dirty="0" smtClean="0"/>
-                  <a:t> Eve.</a:t>
-                </a:r>
+                <a:endParaRPr lang="fr-FR" dirty="0" smtClean="0"/>
               </a:p>
               <a:p>
                 <a:pPr lvl="1"/>
@@ -7952,177 +7782,13 @@
                   <a:rPr lang="fr-FR" dirty="0" err="1" smtClean="0"/>
                   <a:t>found</a:t>
                 </a:r>
-                <a:r>
-                  <a:rPr lang="fr-FR" dirty="0" smtClean="0"/>
-                  <a:t>: Eve has </a:t>
-                </a:r>
-                <a:r>
-                  <a:rPr lang="fr-FR" dirty="0" err="1" smtClean="0"/>
-                  <a:t>eavesdropped</a:t>
-                </a:r>
-                <a:r>
-                  <a:rPr lang="fr-FR" dirty="0" smtClean="0"/>
-                  <a:t> on Alice and Bob, the key </a:t>
-                </a:r>
-                <a:r>
-                  <a:rPr lang="fr-FR" dirty="0" err="1" smtClean="0"/>
-                  <a:t>is</a:t>
-                </a:r>
-                <a:r>
-                  <a:rPr lang="fr-FR" dirty="0" smtClean="0"/>
-                  <a:t> </a:t>
-                </a:r>
-                <a:r>
-                  <a:rPr lang="fr-FR" dirty="0" err="1" smtClean="0"/>
-                  <a:t>rejected</a:t>
-                </a:r>
-                <a:r>
-                  <a:rPr lang="fr-FR" dirty="0" smtClean="0"/>
-                  <a:t>.</a:t>
-                </a:r>
+                <a:endParaRPr lang="fr-FR" dirty="0"/>
               </a:p>
               <a:p>
-                <a:r>
-                  <a:rPr lang="fr-FR" dirty="0" smtClean="0"/>
-                  <a:t>To use the One-Time Pad, Alice </a:t>
-                </a:r>
-                <a:r>
-                  <a:rPr lang="fr-FR" dirty="0" err="1" smtClean="0"/>
-                  <a:t>sends</a:t>
-                </a:r>
-                <a:r>
-                  <a:rPr lang="fr-FR" dirty="0" smtClean="0"/>
-                  <a:t> </a:t>
-                </a:r>
-                <a14:m>
-                  <m:oMath xmlns:m="http://schemas.openxmlformats.org/officeDocument/2006/math">
-                    <m:sSup>
-                      <m:sSupPr>
-                        <m:ctrlPr>
-                          <a:rPr lang="fr-FR" b="0" i="1" smtClean="0">
-                            <a:latin typeface="Cambria Math" panose="02040503050406030204" pitchFamily="18" charset="0"/>
-                          </a:rPr>
-                        </m:ctrlPr>
-                      </m:sSupPr>
-                      <m:e>
-                        <m:r>
-                          <a:rPr lang="fr-FR" b="0" i="1" smtClean="0">
-                            <a:latin typeface="Cambria Math" panose="02040503050406030204" pitchFamily="18" charset="0"/>
-                          </a:rPr>
-                          <m:t>2</m:t>
-                        </m:r>
-                      </m:e>
-                      <m:sup>
-                        <m:r>
-                          <a:rPr lang="fr-FR" b="0" i="1" smtClean="0">
-                            <a:latin typeface="Cambria Math" panose="02040503050406030204" pitchFamily="18" charset="0"/>
-                          </a:rPr>
-                          <m:t>𝑛</m:t>
-                        </m:r>
-                      </m:sup>
-                    </m:sSup>
-                  </m:oMath>
-                </a14:m>
-                <a:r>
-                  <a:rPr lang="fr-FR" dirty="0" smtClean="0"/>
-                  <a:t> photons, n </a:t>
-                </a:r>
-                <a:r>
-                  <a:rPr lang="fr-FR" dirty="0" err="1" smtClean="0"/>
-                  <a:t>being</a:t>
-                </a:r>
-                <a:r>
-                  <a:rPr lang="fr-FR" dirty="0" smtClean="0"/>
-                  <a:t> the </a:t>
-                </a:r>
-                <a:r>
-                  <a:rPr lang="fr-FR" dirty="0" err="1" smtClean="0"/>
-                  <a:t>number</a:t>
-                </a:r>
-                <a:r>
-                  <a:rPr lang="fr-FR" dirty="0" smtClean="0"/>
-                  <a:t> of </a:t>
-                </a:r>
-                <a:r>
-                  <a:rPr lang="fr-FR" dirty="0" err="1" smtClean="0"/>
-                  <a:t>characters</a:t>
-                </a:r>
-                <a:r>
-                  <a:rPr lang="fr-FR" dirty="0" smtClean="0"/>
-                  <a:t> of the message to </a:t>
-                </a:r>
-                <a:r>
-                  <a:rPr lang="fr-FR" dirty="0" err="1" smtClean="0"/>
-                  <a:t>cypher</a:t>
-                </a:r>
-                <a:r>
-                  <a:rPr lang="fr-FR" dirty="0" smtClean="0"/>
-                  <a:t>. In the end, the key </a:t>
-                </a:r>
-                <a:r>
-                  <a:rPr lang="fr-FR" dirty="0" err="1" smtClean="0"/>
-                  <a:t>length</a:t>
-                </a:r>
-                <a:r>
-                  <a:rPr lang="fr-FR" dirty="0" smtClean="0"/>
-                  <a:t> must </a:t>
-                </a:r>
-                <a:r>
-                  <a:rPr lang="fr-FR" dirty="0" err="1" smtClean="0"/>
-                  <a:t>be</a:t>
-                </a:r>
-                <a:r>
-                  <a:rPr lang="fr-FR" dirty="0" smtClean="0"/>
-                  <a:t> the </a:t>
-                </a:r>
-                <a:r>
-                  <a:rPr lang="fr-FR" dirty="0" err="1" smtClean="0"/>
-                  <a:t>same</a:t>
-                </a:r>
-                <a:r>
-                  <a:rPr lang="fr-FR" dirty="0" smtClean="0"/>
-                  <a:t> as the message </a:t>
-                </a:r>
-                <a:r>
-                  <a:rPr lang="fr-FR" dirty="0" err="1" smtClean="0"/>
-                  <a:t>length</a:t>
-                </a:r>
-                <a:r>
-                  <a:rPr lang="fr-FR" dirty="0" smtClean="0"/>
-                  <a:t>, </a:t>
-                </a:r>
-                <a:r>
-                  <a:rPr lang="fr-FR" dirty="0" err="1" smtClean="0"/>
-                  <a:t>which</a:t>
-                </a:r>
-                <a:r>
-                  <a:rPr lang="fr-FR" dirty="0" smtClean="0"/>
-                  <a:t> </a:t>
-                </a:r>
-                <a:r>
-                  <a:rPr lang="fr-FR" dirty="0" err="1" smtClean="0"/>
-                  <a:t>often</a:t>
-                </a:r>
-                <a:r>
-                  <a:rPr lang="fr-FR" dirty="0" smtClean="0"/>
-                  <a:t> </a:t>
-                </a:r>
-                <a:r>
-                  <a:rPr lang="fr-FR" dirty="0" err="1" smtClean="0"/>
-                  <a:t>leaves</a:t>
-                </a:r>
-                <a:r>
-                  <a:rPr lang="fr-FR" smtClean="0"/>
-                  <a:t> </a:t>
-                </a:r>
-                <a:r>
-                  <a:rPr lang="fr-FR" smtClean="0"/>
-                  <a:t>a lot of bits </a:t>
-                </a:r>
-                <a:r>
-                  <a:rPr lang="fr-FR" dirty="0" smtClean="0"/>
-                  <a:t>to sacrifice.</a:t>
-                </a:r>
+                <a:pPr marL="0" indent="0">
+                  <a:buNone/>
+                </a:pPr>
+                <a:endParaRPr lang="fr-FR" dirty="0" smtClean="0"/>
               </a:p>
               <a:p>
                 <a:r>
@@ -8163,8 +7829,14 @@
                 </a:r>
                 <a:r>
                   <a:rPr lang="fr-FR" i="1" dirty="0"/>
-                  <a:t> Eve (</a:t>
-                </a:r>
+                  <a:t> Eve </a:t>
+                </a:r>
+                <a:endParaRPr lang="fr-FR" i="1" dirty="0" smtClean="0"/>
+              </a:p>
+              <a:p>
+                <a:pPr marL="0" indent="0" algn="ctr">
+                  <a:buNone/>
+                </a:pPr>
                 <a14:m>
                   <m:oMath xmlns:m="http://schemas.openxmlformats.org/officeDocument/2006/math">
                     <m:r>
@@ -8232,7 +7904,21 @@
                 </a14:m>
                 <a:r>
                   <a:rPr lang="fr-FR" i="1" dirty="0"/>
-                  <a:t>, n </a:t>
+                  <a:t>, </a:t>
+                </a:r>
+                <a14:m>
+                  <m:oMath xmlns:m="http://schemas.openxmlformats.org/officeDocument/2006/math">
+                    <m:r>
+                      <a:rPr lang="fr-FR" i="1" dirty="0" smtClean="0">
+                        <a:latin typeface="Cambria Math" panose="02040503050406030204" pitchFamily="18" charset="0"/>
+                      </a:rPr>
+                      <m:t>𝑛</m:t>
+                    </m:r>
+                  </m:oMath>
+                </a14:m>
+                <a:r>
+                  <a:rPr lang="fr-FR" i="1" dirty="0"/>
+                  <a:t> </a:t>
                 </a:r>
                 <a:r>
                   <a:rPr lang="fr-FR" i="1" dirty="0" err="1"/>
@@ -8251,12 +7937,8 @@
                   <a:t> of bits </a:t>
                 </a:r>
                 <a:r>
-                  <a:rPr lang="fr-FR" i="1" dirty="0" err="1"/>
+                  <a:rPr lang="fr-FR" i="1" dirty="0" err="1" smtClean="0"/>
                   <a:t>sacrificed</a:t>
-                </a:r>
-                <a:r>
-                  <a:rPr lang="fr-FR" i="1" dirty="0"/>
-                  <a:t>) </a:t>
                 </a:r>
                 <a:endParaRPr lang="fr-FR" i="1" dirty="0" smtClean="0"/>
               </a:p>
@@ -8286,7 +7968,7 @@
               <a:blipFill rotWithShape="0">
                 <a:blip r:embed="rId2"/>
                 <a:stretch>
-                  <a:fillRect l="-1338" t="-9062" r="-304"/>
+                  <a:fillRect l="-1521" t="-7949" r="-122"/>
                 </a:stretch>
               </a:blipFill>
             </p:spPr>
@@ -8309,6 +7991,281 @@
     <p:extLst>
       <p:ext uri="{BB962C8B-B14F-4D97-AF65-F5344CB8AC3E}">
         <p14:creationId xmlns:p14="http://schemas.microsoft.com/office/powerpoint/2010/main" val="934586836"/>
+      </p:ext>
+    </p:extLst>
+  </p:cSld>
+  <p:clrMapOvr>
+    <a:masterClrMapping/>
+  </p:clrMapOvr>
+  <p:timing>
+    <p:tnLst>
+      <p:par>
+        <p:cTn id="1" dur="indefinite" restart="never" nodeType="tmRoot"/>
+      </p:par>
+    </p:tnLst>
+  </p:timing>
+</p:sld>
+</file>
+
+<file path=ppt/slides/slide7.xml><?xml version="1.0" encoding="utf-8"?>
+<p:sld xmlns:a="http://schemas.openxmlformats.org/drawingml/2006/main" xmlns:r="http://schemas.openxmlformats.org/officeDocument/2006/relationships" xmlns:p="http://schemas.openxmlformats.org/presentationml/2006/main">
+  <p:cSld>
+    <p:spTree>
+      <p:nvGrpSpPr>
+        <p:cNvPr id="1" name=""/>
+        <p:cNvGrpSpPr/>
+        <p:nvPr/>
+      </p:nvGrpSpPr>
+      <p:grpSpPr>
+        <a:xfrm>
+          <a:off x="0" y="0"/>
+          <a:ext cx="0" cy="0"/>
+          <a:chOff x="0" y="0"/>
+          <a:chExt cx="0" cy="0"/>
+        </a:xfrm>
+      </p:grpSpPr>
+      <p:sp>
+        <p:nvSpPr>
+          <p:cNvPr id="2" name="Titre 1"/>
+          <p:cNvSpPr>
+            <a:spLocks noGrp="1"/>
+          </p:cNvSpPr>
+          <p:nvPr>
+            <p:ph type="title"/>
+          </p:nvPr>
+        </p:nvSpPr>
+        <p:spPr/>
+        <p:txBody>
+          <a:bodyPr/>
+          <a:lstStyle/>
+          <a:p>
+            <a:r>
+              <a:rPr lang="fr-FR" dirty="0" err="1" smtClean="0"/>
+              <a:t>Symbols</a:t>
+            </a:r>
+            <a:r>
+              <a:rPr lang="fr-FR" dirty="0" smtClean="0"/>
+              <a:t> </a:t>
+            </a:r>
+            <a:r>
+              <a:rPr lang="fr-FR" dirty="0" err="1" smtClean="0"/>
+              <a:t>we</a:t>
+            </a:r>
+            <a:r>
+              <a:rPr lang="fr-FR" dirty="0" smtClean="0"/>
+              <a:t> </a:t>
+            </a:r>
+            <a:r>
+              <a:rPr lang="fr-FR" dirty="0" err="1" smtClean="0"/>
+              <a:t>will</a:t>
+            </a:r>
+            <a:r>
+              <a:rPr lang="fr-FR" dirty="0" smtClean="0"/>
+              <a:t> use </a:t>
+            </a:r>
+            <a:r>
+              <a:rPr lang="fr-FR" dirty="0" err="1" smtClean="0"/>
+              <a:t>during</a:t>
+            </a:r>
+            <a:r>
+              <a:rPr lang="fr-FR" dirty="0" smtClean="0"/>
+              <a:t> </a:t>
+            </a:r>
+            <a:r>
+              <a:rPr lang="fr-FR" dirty="0" err="1" smtClean="0"/>
+              <a:t>our</a:t>
+            </a:r>
+            <a:r>
+              <a:rPr lang="fr-FR" dirty="0" smtClean="0"/>
+              <a:t> simulation</a:t>
+            </a:r>
+            <a:endParaRPr lang="fr-FR" dirty="0"/>
+          </a:p>
+        </p:txBody>
+      </p:sp>
+      <p:pic>
+        <p:nvPicPr>
+          <p:cNvPr id="4" name="Espace réservé du contenu 3"/>
+          <p:cNvPicPr>
+            <a:picLocks noGrp="1" noChangeAspect="1"/>
+          </p:cNvPicPr>
+          <p:nvPr>
+            <p:ph idx="1"/>
+          </p:nvPr>
+        </p:nvPicPr>
+        <p:blipFill>
+          <a:blip r:embed="rId2">
+            <a:extLst>
+              <a:ext uri="{28A0092B-C50C-407E-A947-70E740481C1C}">
+                <a14:useLocalDpi xmlns:a14="http://schemas.microsoft.com/office/drawing/2010/main" val="0"/>
+              </a:ext>
+            </a:extLst>
+          </a:blip>
+          <a:stretch>
+            <a:fillRect/>
+          </a:stretch>
+        </p:blipFill>
+        <p:spPr>
+          <a:xfrm>
+            <a:off x="1714591" y="2438398"/>
+            <a:ext cx="1714736" cy="1714739"/>
+          </a:xfrm>
+        </p:spPr>
+      </p:pic>
+      <p:pic>
+        <p:nvPicPr>
+          <p:cNvPr id="5" name="Image 4"/>
+          <p:cNvPicPr>
+            <a:picLocks noChangeAspect="1"/>
+          </p:cNvPicPr>
+          <p:nvPr/>
+        </p:nvPicPr>
+        <p:blipFill>
+          <a:blip r:embed="rId3">
+            <a:extLst>
+              <a:ext uri="{28A0092B-C50C-407E-A947-70E740481C1C}">
+                <a14:useLocalDpi xmlns:a14="http://schemas.microsoft.com/office/drawing/2010/main" val="0"/>
+              </a:ext>
+            </a:extLst>
+          </a:blip>
+          <a:stretch>
+            <a:fillRect/>
+          </a:stretch>
+        </p:blipFill>
+        <p:spPr>
+          <a:xfrm>
+            <a:off x="6626846" y="2438398"/>
+            <a:ext cx="1714736" cy="1714739"/>
+          </a:xfrm>
+          <a:prstGeom prst="rect">
+            <a:avLst/>
+          </a:prstGeom>
+        </p:spPr>
+      </p:pic>
+      <p:pic>
+        <p:nvPicPr>
+          <p:cNvPr id="6" name="Image 5"/>
+          <p:cNvPicPr>
+            <a:picLocks noChangeAspect="1"/>
+          </p:cNvPicPr>
+          <p:nvPr/>
+        </p:nvPicPr>
+        <p:blipFill>
+          <a:blip r:embed="rId4">
+            <a:extLst>
+              <a:ext uri="{28A0092B-C50C-407E-A947-70E740481C1C}">
+                <a14:useLocalDpi xmlns:a14="http://schemas.microsoft.com/office/drawing/2010/main" val="0"/>
+              </a:ext>
+            </a:extLst>
+          </a:blip>
+          <a:stretch>
+            <a:fillRect/>
+          </a:stretch>
+        </p:blipFill>
+        <p:spPr>
+          <a:xfrm>
+            <a:off x="4973343" y="2438398"/>
+            <a:ext cx="1714736" cy="1714739"/>
+          </a:xfrm>
+          <a:prstGeom prst="rect">
+            <a:avLst/>
+          </a:prstGeom>
+        </p:spPr>
+      </p:pic>
+      <p:pic>
+        <p:nvPicPr>
+          <p:cNvPr id="7" name="Image 6"/>
+          <p:cNvPicPr>
+            <a:picLocks noChangeAspect="1"/>
+          </p:cNvPicPr>
+          <p:nvPr/>
+        </p:nvPicPr>
+        <p:blipFill>
+          <a:blip r:embed="rId5">
+            <a:extLst>
+              <a:ext uri="{28A0092B-C50C-407E-A947-70E740481C1C}">
+                <a14:useLocalDpi xmlns:a14="http://schemas.microsoft.com/office/drawing/2010/main" val="0"/>
+              </a:ext>
+            </a:extLst>
+          </a:blip>
+          <a:stretch>
+            <a:fillRect/>
+          </a:stretch>
+        </p:blipFill>
+        <p:spPr>
+          <a:xfrm>
+            <a:off x="8280349" y="2438398"/>
+            <a:ext cx="1714736" cy="1714739"/>
+          </a:xfrm>
+          <a:prstGeom prst="rect">
+            <a:avLst/>
+          </a:prstGeom>
+        </p:spPr>
+      </p:pic>
+      <p:pic>
+        <p:nvPicPr>
+          <p:cNvPr id="8" name="Image 7"/>
+          <p:cNvPicPr>
+            <a:picLocks noChangeAspect="1"/>
+          </p:cNvPicPr>
+          <p:nvPr/>
+        </p:nvPicPr>
+        <p:blipFill>
+          <a:blip r:embed="rId6">
+            <a:extLst>
+              <a:ext uri="{28A0092B-C50C-407E-A947-70E740481C1C}">
+                <a14:useLocalDpi xmlns:a14="http://schemas.microsoft.com/office/drawing/2010/main" val="0"/>
+              </a:ext>
+            </a:extLst>
+          </a:blip>
+          <a:stretch>
+            <a:fillRect/>
+          </a:stretch>
+        </p:blipFill>
+        <p:spPr>
+          <a:xfrm>
+            <a:off x="9933850" y="2438398"/>
+            <a:ext cx="1714736" cy="1714739"/>
+          </a:xfrm>
+          <a:prstGeom prst="rect">
+            <a:avLst/>
+          </a:prstGeom>
+        </p:spPr>
+      </p:pic>
+      <p:pic>
+        <p:nvPicPr>
+          <p:cNvPr id="10" name="Image 9"/>
+          <p:cNvPicPr>
+            <a:picLocks noChangeAspect="1"/>
+          </p:cNvPicPr>
+          <p:nvPr/>
+        </p:nvPicPr>
+        <p:blipFill>
+          <a:blip r:embed="rId7">
+            <a:extLst>
+              <a:ext uri="{28A0092B-C50C-407E-A947-70E740481C1C}">
+                <a14:useLocalDpi xmlns:a14="http://schemas.microsoft.com/office/drawing/2010/main" val="0"/>
+              </a:ext>
+            </a:extLst>
+          </a:blip>
+          <a:stretch>
+            <a:fillRect/>
+          </a:stretch>
+        </p:blipFill>
+        <p:spPr>
+          <a:xfrm>
+            <a:off x="3368094" y="2462525"/>
+            <a:ext cx="1666482" cy="1666485"/>
+          </a:xfrm>
+          <a:prstGeom prst="rect">
+            <a:avLst/>
+          </a:prstGeom>
+        </p:spPr>
+      </p:pic>
+    </p:spTree>
+    <p:extLst>
+      <p:ext uri="{BB962C8B-B14F-4D97-AF65-F5344CB8AC3E}">
+        <p14:creationId xmlns:p14="http://schemas.microsoft.com/office/powerpoint/2010/main" val="4075163084"/>
       </p:ext>
     </p:extLst>
   </p:cSld>

</xml_diff>

<commit_message>
Ajout de transitions dans le Power Point
</commit_message>
<xml_diff>
--- a/Simulations of Quantum Cryptography.pptx
+++ b/Simulations of Quantum Cryptography.pptx
@@ -621,7 +621,7 @@
             <a:fld id="{B61BEF0D-F0BB-DE4B-95CE-6DB70DBA9567}" type="datetimeFigureOut">
               <a:rPr lang="en-US" dirty="0"/>
               <a:pPr/>
-              <a:t>5/20/2015</a:t>
+              <a:t>5/21/2015</a:t>
             </a:fld>
             <a:endParaRPr lang="en-US" dirty="0"/>
           </a:p>
@@ -680,6 +680,18 @@
   <p:clrMapOvr>
     <a:masterClrMapping/>
   </p:clrMapOvr>
+  <mc:AlternateContent xmlns:mc="http://schemas.openxmlformats.org/markup-compatibility/2006">
+    <mc:Choice xmlns:p14="http://schemas.microsoft.com/office/powerpoint/2010/main" Requires="p14">
+      <p:transition spd="slow">
+        <p14:reveal/>
+      </p:transition>
+    </mc:Choice>
+    <mc:Fallback>
+      <p:transition spd="slow">
+        <p:fade/>
+      </p:transition>
+    </mc:Fallback>
+  </mc:AlternateContent>
 </p:sldLayout>
 </file>
 
@@ -914,7 +926,7 @@
             <a:fld id="{B61BEF0D-F0BB-DE4B-95CE-6DB70DBA9567}" type="datetimeFigureOut">
               <a:rPr lang="en-US" dirty="0"/>
               <a:pPr/>
-              <a:t>5/20/2015</a:t>
+              <a:t>5/21/2015</a:t>
             </a:fld>
             <a:endParaRPr lang="en-US" dirty="0"/>
           </a:p>
@@ -968,6 +980,18 @@
   <p:clrMapOvr>
     <a:masterClrMapping/>
   </p:clrMapOvr>
+  <mc:AlternateContent xmlns:mc="http://schemas.openxmlformats.org/markup-compatibility/2006">
+    <mc:Choice xmlns:p14="http://schemas.microsoft.com/office/powerpoint/2010/main" Requires="p14">
+      <p:transition spd="slow">
+        <p14:reveal/>
+      </p:transition>
+    </mc:Choice>
+    <mc:Fallback>
+      <p:transition spd="slow">
+        <p:fade/>
+      </p:transition>
+    </mc:Fallback>
+  </mc:AlternateContent>
 </p:sldLayout>
 </file>
 
@@ -1159,7 +1183,7 @@
             <a:fld id="{B61BEF0D-F0BB-DE4B-95CE-6DB70DBA9567}" type="datetimeFigureOut">
               <a:rPr lang="en-US" dirty="0"/>
               <a:pPr/>
-              <a:t>5/20/2015</a:t>
+              <a:t>5/21/2015</a:t>
             </a:fld>
             <a:endParaRPr lang="en-US" dirty="0"/>
           </a:p>
@@ -1213,6 +1237,18 @@
   <p:clrMapOvr>
     <a:masterClrMapping/>
   </p:clrMapOvr>
+  <mc:AlternateContent xmlns:mc="http://schemas.openxmlformats.org/markup-compatibility/2006">
+    <mc:Choice xmlns:p14="http://schemas.microsoft.com/office/powerpoint/2010/main" Requires="p14">
+      <p:transition spd="slow">
+        <p14:reveal/>
+      </p:transition>
+    </mc:Choice>
+    <mc:Fallback>
+      <p:transition spd="slow">
+        <p:fade/>
+      </p:transition>
+    </mc:Fallback>
+  </mc:AlternateContent>
 </p:sldLayout>
 </file>
 
@@ -1696,7 +1732,7 @@
             <a:fld id="{B61BEF0D-F0BB-DE4B-95CE-6DB70DBA9567}" type="datetimeFigureOut">
               <a:rPr lang="en-US" dirty="0"/>
               <a:pPr/>
-              <a:t>5/20/2015</a:t>
+              <a:t>5/21/2015</a:t>
             </a:fld>
             <a:endParaRPr lang="en-US" dirty="0"/>
           </a:p>
@@ -1750,6 +1786,18 @@
   <p:clrMapOvr>
     <a:masterClrMapping/>
   </p:clrMapOvr>
+  <mc:AlternateContent xmlns:mc="http://schemas.openxmlformats.org/markup-compatibility/2006">
+    <mc:Choice xmlns:p14="http://schemas.microsoft.com/office/powerpoint/2010/main" Requires="p14">
+      <p:transition spd="slow">
+        <p14:reveal/>
+      </p:transition>
+    </mc:Choice>
+    <mc:Fallback>
+      <p:transition spd="slow">
+        <p:fade/>
+      </p:transition>
+    </mc:Fallback>
+  </mc:AlternateContent>
 </p:sldLayout>
 </file>
 
@@ -1941,7 +1989,7 @@
             <a:fld id="{B61BEF0D-F0BB-DE4B-95CE-6DB70DBA9567}" type="datetimeFigureOut">
               <a:rPr lang="en-US" dirty="0"/>
               <a:pPr/>
-              <a:t>5/20/2015</a:t>
+              <a:t>5/21/2015</a:t>
             </a:fld>
             <a:endParaRPr lang="en-US" dirty="0"/>
           </a:p>
@@ -1995,6 +2043,18 @@
   <p:clrMapOvr>
     <a:masterClrMapping/>
   </p:clrMapOvr>
+  <mc:AlternateContent xmlns:mc="http://schemas.openxmlformats.org/markup-compatibility/2006">
+    <mc:Choice xmlns:p14="http://schemas.microsoft.com/office/powerpoint/2010/main" Requires="p14">
+      <p:transition spd="slow">
+        <p14:reveal/>
+      </p:transition>
+    </mc:Choice>
+    <mc:Fallback>
+      <p:transition spd="slow">
+        <p:fade/>
+      </p:transition>
+    </mc:Fallback>
+  </mc:AlternateContent>
 </p:sldLayout>
 </file>
 
@@ -2470,7 +2530,7 @@
             <a:fld id="{B61BEF0D-F0BB-DE4B-95CE-6DB70DBA9567}" type="datetimeFigureOut">
               <a:rPr lang="en-US" dirty="0"/>
               <a:pPr/>
-              <a:t>5/20/2015</a:t>
+              <a:t>5/21/2015</a:t>
             </a:fld>
             <a:endParaRPr lang="en-US" dirty="0"/>
           </a:p>
@@ -2524,6 +2584,18 @@
   <p:clrMapOvr>
     <a:masterClrMapping/>
   </p:clrMapOvr>
+  <mc:AlternateContent xmlns:mc="http://schemas.openxmlformats.org/markup-compatibility/2006">
+    <mc:Choice xmlns:p14="http://schemas.microsoft.com/office/powerpoint/2010/main" Requires="p14">
+      <p:transition spd="slow">
+        <p14:reveal/>
+      </p:transition>
+    </mc:Choice>
+    <mc:Fallback>
+      <p:transition spd="slow">
+        <p:fade/>
+      </p:transition>
+    </mc:Fallback>
+  </mc:AlternateContent>
 </p:sldLayout>
 </file>
 
@@ -2764,7 +2836,7 @@
             <a:fld id="{B61BEF0D-F0BB-DE4B-95CE-6DB70DBA9567}" type="datetimeFigureOut">
               <a:rPr lang="en-US" dirty="0"/>
               <a:pPr/>
-              <a:t>5/20/2015</a:t>
+              <a:t>5/21/2015</a:t>
             </a:fld>
             <a:endParaRPr lang="en-US" dirty="0"/>
           </a:p>
@@ -2818,6 +2890,18 @@
   <p:clrMapOvr>
     <a:masterClrMapping/>
   </p:clrMapOvr>
+  <mc:AlternateContent xmlns:mc="http://schemas.openxmlformats.org/markup-compatibility/2006">
+    <mc:Choice xmlns:p14="http://schemas.microsoft.com/office/powerpoint/2010/main" Requires="p14">
+      <p:transition spd="slow">
+        <p14:reveal/>
+      </p:transition>
+    </mc:Choice>
+    <mc:Fallback>
+      <p:transition spd="slow">
+        <p:fade/>
+      </p:transition>
+    </mc:Fallback>
+  </mc:AlternateContent>
 </p:sldLayout>
 </file>
 
@@ -2935,7 +3019,7 @@
             <a:fld id="{B61BEF0D-F0BB-DE4B-95CE-6DB70DBA9567}" type="datetimeFigureOut">
               <a:rPr lang="en-US" dirty="0"/>
               <a:pPr/>
-              <a:t>5/20/2015</a:t>
+              <a:t>5/21/2015</a:t>
             </a:fld>
             <a:endParaRPr lang="en-US" dirty="0"/>
           </a:p>
@@ -2989,6 +3073,18 @@
   <p:clrMapOvr>
     <a:masterClrMapping/>
   </p:clrMapOvr>
+  <mc:AlternateContent xmlns:mc="http://schemas.openxmlformats.org/markup-compatibility/2006">
+    <mc:Choice xmlns:p14="http://schemas.microsoft.com/office/powerpoint/2010/main" Requires="p14">
+      <p:transition spd="slow">
+        <p14:reveal/>
+      </p:transition>
+    </mc:Choice>
+    <mc:Fallback>
+      <p:transition spd="slow">
+        <p:fade/>
+      </p:transition>
+    </mc:Fallback>
+  </mc:AlternateContent>
 </p:sldLayout>
 </file>
 
@@ -3112,7 +3208,7 @@
             <a:fld id="{B61BEF0D-F0BB-DE4B-95CE-6DB70DBA9567}" type="datetimeFigureOut">
               <a:rPr lang="en-US" dirty="0"/>
               <a:pPr/>
-              <a:t>5/20/2015</a:t>
+              <a:t>5/21/2015</a:t>
             </a:fld>
             <a:endParaRPr lang="en-US" dirty="0"/>
           </a:p>
@@ -3166,6 +3262,18 @@
   <p:clrMapOvr>
     <a:masterClrMapping/>
   </p:clrMapOvr>
+  <mc:AlternateContent xmlns:mc="http://schemas.openxmlformats.org/markup-compatibility/2006">
+    <mc:Choice xmlns:p14="http://schemas.microsoft.com/office/powerpoint/2010/main" Requires="p14">
+      <p:transition spd="slow">
+        <p14:reveal/>
+      </p:transition>
+    </mc:Choice>
+    <mc:Fallback>
+      <p:transition spd="slow">
+        <p:fade/>
+      </p:transition>
+    </mc:Fallback>
+  </mc:AlternateContent>
 </p:sldLayout>
 </file>
 
@@ -3279,7 +3387,7 @@
             <a:fld id="{B61BEF0D-F0BB-DE4B-95CE-6DB70DBA9567}" type="datetimeFigureOut">
               <a:rPr lang="en-US" dirty="0"/>
               <a:pPr/>
-              <a:t>5/20/2015</a:t>
+              <a:t>5/21/2015</a:t>
             </a:fld>
             <a:endParaRPr lang="en-US" dirty="0"/>
           </a:p>
@@ -3338,6 +3446,18 @@
   <p:clrMapOvr>
     <a:masterClrMapping/>
   </p:clrMapOvr>
+  <mc:AlternateContent xmlns:mc="http://schemas.openxmlformats.org/markup-compatibility/2006">
+    <mc:Choice xmlns:p14="http://schemas.microsoft.com/office/powerpoint/2010/main" Requires="p14">
+      <p:transition spd="slow">
+        <p14:reveal/>
+      </p:transition>
+    </mc:Choice>
+    <mc:Fallback>
+      <p:transition spd="slow">
+        <p:fade/>
+      </p:transition>
+    </mc:Fallback>
+  </mc:AlternateContent>
 </p:sldLayout>
 </file>
 
@@ -3527,7 +3647,7 @@
             <a:fld id="{B61BEF0D-F0BB-DE4B-95CE-6DB70DBA9567}" type="datetimeFigureOut">
               <a:rPr lang="en-US" dirty="0"/>
               <a:pPr/>
-              <a:t>5/20/2015</a:t>
+              <a:t>5/21/2015</a:t>
             </a:fld>
             <a:endParaRPr lang="en-US" dirty="0"/>
           </a:p>
@@ -3581,6 +3701,18 @@
   <p:clrMapOvr>
     <a:masterClrMapping/>
   </p:clrMapOvr>
+  <mc:AlternateContent xmlns:mc="http://schemas.openxmlformats.org/markup-compatibility/2006">
+    <mc:Choice xmlns:p14="http://schemas.microsoft.com/office/powerpoint/2010/main" Requires="p14">
+      <p:transition spd="slow">
+        <p14:reveal/>
+      </p:transition>
+    </mc:Choice>
+    <mc:Fallback>
+      <p:transition spd="slow">
+        <p:fade/>
+      </p:transition>
+    </mc:Fallback>
+  </mc:AlternateContent>
 </p:sldLayout>
 </file>
 
@@ -3821,7 +3953,7 @@
             <a:fld id="{B61BEF0D-F0BB-DE4B-95CE-6DB70DBA9567}" type="datetimeFigureOut">
               <a:rPr lang="en-US" dirty="0"/>
               <a:pPr/>
-              <a:t>5/20/2015</a:t>
+              <a:t>5/21/2015</a:t>
             </a:fld>
             <a:endParaRPr lang="en-US" dirty="0"/>
           </a:p>
@@ -3875,6 +4007,18 @@
   <p:clrMapOvr>
     <a:masterClrMapping/>
   </p:clrMapOvr>
+  <mc:AlternateContent xmlns:mc="http://schemas.openxmlformats.org/markup-compatibility/2006">
+    <mc:Choice xmlns:p14="http://schemas.microsoft.com/office/powerpoint/2010/main" Requires="p14">
+      <p:transition spd="slow">
+        <p14:reveal/>
+      </p:transition>
+    </mc:Choice>
+    <mc:Fallback>
+      <p:transition spd="slow">
+        <p:fade/>
+      </p:transition>
+    </mc:Fallback>
+  </mc:AlternateContent>
 </p:sldLayout>
 </file>
 
@@ -4260,7 +4404,7 @@
             <a:fld id="{B61BEF0D-F0BB-DE4B-95CE-6DB70DBA9567}" type="datetimeFigureOut">
               <a:rPr lang="en-US" dirty="0"/>
               <a:pPr/>
-              <a:t>5/20/2015</a:t>
+              <a:t>5/21/2015</a:t>
             </a:fld>
             <a:endParaRPr lang="en-US" dirty="0"/>
           </a:p>
@@ -4314,6 +4458,18 @@
   <p:clrMapOvr>
     <a:masterClrMapping/>
   </p:clrMapOvr>
+  <mc:AlternateContent xmlns:mc="http://schemas.openxmlformats.org/markup-compatibility/2006">
+    <mc:Choice xmlns:p14="http://schemas.microsoft.com/office/powerpoint/2010/main" Requires="p14">
+      <p:transition spd="slow">
+        <p14:reveal/>
+      </p:transition>
+    </mc:Choice>
+    <mc:Fallback>
+      <p:transition spd="slow">
+        <p:fade/>
+      </p:transition>
+    </mc:Fallback>
+  </mc:AlternateContent>
 </p:sldLayout>
 </file>
 
@@ -4375,7 +4531,7 @@
             <a:fld id="{B61BEF0D-F0BB-DE4B-95CE-6DB70DBA9567}" type="datetimeFigureOut">
               <a:rPr lang="en-US" dirty="0"/>
               <a:pPr/>
-              <a:t>5/20/2015</a:t>
+              <a:t>5/21/2015</a:t>
             </a:fld>
             <a:endParaRPr lang="en-US" dirty="0"/>
           </a:p>
@@ -4429,6 +4585,18 @@
   <p:clrMapOvr>
     <a:masterClrMapping/>
   </p:clrMapOvr>
+  <mc:AlternateContent xmlns:mc="http://schemas.openxmlformats.org/markup-compatibility/2006">
+    <mc:Choice xmlns:p14="http://schemas.microsoft.com/office/powerpoint/2010/main" Requires="p14">
+      <p:transition spd="slow">
+        <p14:reveal/>
+      </p:transition>
+    </mc:Choice>
+    <mc:Fallback>
+      <p:transition spd="slow">
+        <p:fade/>
+      </p:transition>
+    </mc:Fallback>
+  </mc:AlternateContent>
 </p:sldLayout>
 </file>
 
@@ -4467,7 +4635,7 @@
             <a:fld id="{B61BEF0D-F0BB-DE4B-95CE-6DB70DBA9567}" type="datetimeFigureOut">
               <a:rPr lang="en-US" dirty="0"/>
               <a:pPr/>
-              <a:t>5/20/2015</a:t>
+              <a:t>5/21/2015</a:t>
             </a:fld>
             <a:endParaRPr lang="en-US" dirty="0"/>
           </a:p>
@@ -4521,6 +4689,18 @@
   <p:clrMapOvr>
     <a:masterClrMapping/>
   </p:clrMapOvr>
+  <mc:AlternateContent xmlns:mc="http://schemas.openxmlformats.org/markup-compatibility/2006">
+    <mc:Choice xmlns:p14="http://schemas.microsoft.com/office/powerpoint/2010/main" Requires="p14">
+      <p:transition spd="slow">
+        <p14:reveal/>
+      </p:transition>
+    </mc:Choice>
+    <mc:Fallback>
+      <p:transition spd="slow">
+        <p:fade/>
+      </p:transition>
+    </mc:Fallback>
+  </mc:AlternateContent>
 </p:sldLayout>
 </file>
 
@@ -4747,7 +4927,7 @@
             <a:fld id="{B61BEF0D-F0BB-DE4B-95CE-6DB70DBA9567}" type="datetimeFigureOut">
               <a:rPr lang="en-US" dirty="0"/>
               <a:pPr/>
-              <a:t>5/20/2015</a:t>
+              <a:t>5/21/2015</a:t>
             </a:fld>
             <a:endParaRPr lang="en-US" dirty="0"/>
           </a:p>
@@ -4801,6 +4981,18 @@
   <p:clrMapOvr>
     <a:masterClrMapping/>
   </p:clrMapOvr>
+  <mc:AlternateContent xmlns:mc="http://schemas.openxmlformats.org/markup-compatibility/2006">
+    <mc:Choice xmlns:p14="http://schemas.microsoft.com/office/powerpoint/2010/main" Requires="p14">
+      <p:transition spd="slow">
+        <p14:reveal/>
+      </p:transition>
+    </mc:Choice>
+    <mc:Fallback>
+      <p:transition spd="slow">
+        <p:fade/>
+      </p:transition>
+    </mc:Fallback>
+  </mc:AlternateContent>
 </p:sldLayout>
 </file>
 
@@ -5035,7 +5227,7 @@
             <a:fld id="{B61BEF0D-F0BB-DE4B-95CE-6DB70DBA9567}" type="datetimeFigureOut">
               <a:rPr lang="en-US" dirty="0"/>
               <a:pPr/>
-              <a:t>5/20/2015</a:t>
+              <a:t>5/21/2015</a:t>
             </a:fld>
             <a:endParaRPr lang="en-US" dirty="0"/>
           </a:p>
@@ -5089,6 +5281,18 @@
   <p:clrMapOvr>
     <a:masterClrMapping/>
   </p:clrMapOvr>
+  <mc:AlternateContent xmlns:mc="http://schemas.openxmlformats.org/markup-compatibility/2006">
+    <mc:Choice xmlns:p14="http://schemas.microsoft.com/office/powerpoint/2010/main" Requires="p14">
+      <p:transition spd="slow">
+        <p14:reveal/>
+      </p:transition>
+    </mc:Choice>
+    <mc:Fallback>
+      <p:transition spd="slow">
+        <p:fade/>
+      </p:transition>
+    </mc:Fallback>
+  </mc:AlternateContent>
 </p:sldLayout>
 </file>
 
@@ -5562,7 +5766,7 @@
             <a:fld id="{B61BEF0D-F0BB-DE4B-95CE-6DB70DBA9567}" type="datetimeFigureOut">
               <a:rPr lang="en-US" dirty="0"/>
               <a:pPr/>
-              <a:t>5/20/2015</a:t>
+              <a:t>5/21/2015</a:t>
             </a:fld>
             <a:endParaRPr lang="en-US" dirty="0"/>
           </a:p>
@@ -5669,6 +5873,18 @@
     <p:sldLayoutId id="2147483658" r:id="rId16"/>
     <p:sldLayoutId id="2147483659" r:id="rId17"/>
   </p:sldLayoutIdLst>
+  <mc:AlternateContent xmlns:mc="http://schemas.openxmlformats.org/markup-compatibility/2006">
+    <mc:Choice xmlns:p14="http://schemas.microsoft.com/office/powerpoint/2010/main" Requires="p14">
+      <p:transition spd="slow">
+        <p14:reveal/>
+      </p:transition>
+    </mc:Choice>
+    <mc:Fallback>
+      <p:transition spd="slow">
+        <p:fade/>
+      </p:transition>
+    </mc:Fallback>
+  </mc:AlternateContent>
   <p:txStyles>
     <p:titleStyle>
       <a:lvl1pPr algn="ctr" defTabSz="457200" rtl="0" eaLnBrk="1" latinLnBrk="0" hangingPunct="1">
@@ -6183,6 +6399,18 @@
   <p:clrMapOvr>
     <a:masterClrMapping/>
   </p:clrMapOvr>
+  <mc:AlternateContent xmlns:mc="http://schemas.openxmlformats.org/markup-compatibility/2006">
+    <mc:Choice xmlns:p14="http://schemas.microsoft.com/office/powerpoint/2010/main" Requires="p14">
+      <p:transition spd="slow">
+        <p14:reveal/>
+      </p:transition>
+    </mc:Choice>
+    <mc:Fallback>
+      <p:transition spd="slow">
+        <p:fade/>
+      </p:transition>
+    </mc:Fallback>
+  </mc:AlternateContent>
   <p:timing>
     <p:tnLst>
       <p:par>
@@ -6267,6 +6495,18 @@
   <p:clrMapOvr>
     <a:masterClrMapping/>
   </p:clrMapOvr>
+  <mc:AlternateContent xmlns:mc="http://schemas.openxmlformats.org/markup-compatibility/2006">
+    <mc:Choice xmlns:p14="http://schemas.microsoft.com/office/powerpoint/2010/main" Requires="p14">
+      <p:transition spd="slow">
+        <p14:reveal/>
+      </p:transition>
+    </mc:Choice>
+    <mc:Fallback>
+      <p:transition spd="slow">
+        <p:fade/>
+      </p:transition>
+    </mc:Fallback>
+  </mc:AlternateContent>
   <p:timing>
     <p:tnLst>
       <p:par>
@@ -6692,6 +6932,18 @@
   <p:clrMapOvr>
     <a:masterClrMapping/>
   </p:clrMapOvr>
+  <mc:AlternateContent xmlns:mc="http://schemas.openxmlformats.org/markup-compatibility/2006">
+    <mc:Choice xmlns:p14="http://schemas.microsoft.com/office/powerpoint/2010/main" Requires="p14">
+      <p:transition spd="slow">
+        <p14:reveal/>
+      </p:transition>
+    </mc:Choice>
+    <mc:Fallback>
+      <p:transition spd="slow">
+        <p:fade/>
+      </p:transition>
+    </mc:Fallback>
+  </mc:AlternateContent>
   <p:timing>
     <p:tnLst>
       <p:par>
@@ -7049,6 +7301,18 @@
   <p:clrMapOvr>
     <a:masterClrMapping/>
   </p:clrMapOvr>
+  <mc:AlternateContent xmlns:mc="http://schemas.openxmlformats.org/markup-compatibility/2006">
+    <mc:Choice xmlns:p14="http://schemas.microsoft.com/office/powerpoint/2010/main" Requires="p14">
+      <p:transition spd="slow">
+        <p14:reveal/>
+      </p:transition>
+    </mc:Choice>
+    <mc:Fallback>
+      <p:transition spd="slow">
+        <p:fade/>
+      </p:transition>
+    </mc:Fallback>
+  </mc:AlternateContent>
   <p:timing>
     <p:tnLst>
       <p:par>
@@ -7140,8 +7404,8 @@
           </a:p>
         </p:txBody>
       </p:sp>
-      <mc:AlternateContent xmlns:mc="http://schemas.openxmlformats.org/markup-compatibility/2006">
-        <mc:Choice xmlns:a14="http://schemas.microsoft.com/office/drawing/2010/main" Requires="a14">
+      <mc:AlternateContent xmlns:mc="http://schemas.openxmlformats.org/markup-compatibility/2006" xmlns:a14="http://schemas.microsoft.com/office/drawing/2010/main">
+        <mc:Choice Requires="a14">
           <p:sp>
             <p:nvSpPr>
               <p:cNvPr id="3" name="Espace réservé du contenu 2"/>
@@ -7237,11 +7501,7 @@
                 </a:r>
                 <a:r>
                   <a:rPr lang="fr-FR" dirty="0" smtClean="0"/>
-                  <a:t> a </a:t>
-                </a:r>
-                <a:r>
-                  <a:rPr lang="fr-FR" dirty="0" smtClean="0"/>
-                  <a:t>photon. </a:t>
+                  <a:t> a photon. </a:t>
                 </a:r>
                 <a:r>
                   <a:rPr lang="fr-FR" dirty="0" err="1" smtClean="0"/>
@@ -7275,7 +7535,6 @@
                   <a:rPr lang="fr-FR" dirty="0" smtClean="0"/>
                   <a:t>: </a:t>
                 </a:r>
-                <a:endParaRPr lang="fr-FR" dirty="0" smtClean="0"/>
               </a:p>
               <a:p>
                 <a:pPr lvl="1"/>
@@ -7301,11 +7560,7 @@
                 </a:r>
                 <a:r>
                   <a:rPr lang="fr-FR" dirty="0" smtClean="0"/>
-                  <a:t> (50% </a:t>
-                </a:r>
-                <a:r>
-                  <a:rPr lang="fr-FR" dirty="0" smtClean="0"/>
-                  <a:t>chance)</a:t>
+                  <a:t> (50% chance)</a:t>
                 </a:r>
               </a:p>
               <a:p>
@@ -7340,13 +7595,8 @@
                 </a:r>
                 <a:r>
                   <a:rPr lang="fr-FR" dirty="0" smtClean="0"/>
-                  <a:t> (50% </a:t>
-                </a:r>
-                <a:r>
-                  <a:rPr lang="fr-FR" dirty="0" smtClean="0"/>
-                  <a:t>chance)</a:t>
-                </a:r>
-                <a:endParaRPr lang="fr-FR" dirty="0" smtClean="0"/>
+                  <a:t> (50% chance)</a:t>
+                </a:r>
               </a:p>
               <a:p>
                 <a:pPr lvl="1"/>
@@ -7481,7 +7731,6 @@
                   <a:rPr lang="fr-FR" sz="1900" dirty="0" smtClean="0"/>
                   <a:t>)</a:t>
                 </a:r>
-                <a:endParaRPr lang="fr-FR" sz="1900" dirty="0" smtClean="0"/>
               </a:p>
               <a:p>
                 <a:pPr marL="0" indent="0">
@@ -7492,7 +7741,7 @@
             </p:txBody>
           </p:sp>
         </mc:Choice>
-        <mc:Fallback>
+        <mc:Fallback xmlns="">
           <p:sp>
             <p:nvSpPr>
               <p:cNvPr id="3" name="Espace réservé du contenu 2"/>
@@ -7536,6 +7785,18 @@
   <p:clrMapOvr>
     <a:masterClrMapping/>
   </p:clrMapOvr>
+  <mc:AlternateContent xmlns:mc="http://schemas.openxmlformats.org/markup-compatibility/2006">
+    <mc:Choice xmlns:p14="http://schemas.microsoft.com/office/powerpoint/2010/main" Requires="p14">
+      <p:transition spd="slow">
+        <p14:reveal/>
+      </p:transition>
+    </mc:Choice>
+    <mc:Fallback>
+      <p:transition spd="slow">
+        <p:fade/>
+      </p:transition>
+    </mc:Fallback>
+  </mc:AlternateContent>
   <p:timing>
     <p:tnLst>
       <p:par>
@@ -7623,8 +7884,8 @@
           </a:p>
         </p:txBody>
       </p:sp>
-      <mc:AlternateContent xmlns:mc="http://schemas.openxmlformats.org/markup-compatibility/2006">
-        <mc:Choice xmlns:a14="http://schemas.microsoft.com/office/drawing/2010/main" Requires="a14">
+      <mc:AlternateContent xmlns:mc="http://schemas.openxmlformats.org/markup-compatibility/2006" xmlns:a14="http://schemas.microsoft.com/office/drawing/2010/main">
+        <mc:Choice Requires="a14">
           <p:sp>
             <p:nvSpPr>
               <p:cNvPr id="3" name="Espace réservé du contenu 2"/>
@@ -7949,7 +8210,7 @@
             </p:txBody>
           </p:sp>
         </mc:Choice>
-        <mc:Fallback>
+        <mc:Fallback xmlns="">
           <p:sp>
             <p:nvSpPr>
               <p:cNvPr id="3" name="Espace réservé du contenu 2"/>
@@ -7997,6 +8258,18 @@
   <p:clrMapOvr>
     <a:masterClrMapping/>
   </p:clrMapOvr>
+  <mc:AlternateContent xmlns:mc="http://schemas.openxmlformats.org/markup-compatibility/2006">
+    <mc:Choice xmlns:p14="http://schemas.microsoft.com/office/powerpoint/2010/main" Requires="p14">
+      <p:transition spd="slow">
+        <p14:reveal/>
+      </p:transition>
+    </mc:Choice>
+    <mc:Fallback>
+      <p:transition spd="slow">
+        <p:fade/>
+      </p:transition>
+    </mc:Fallback>
+  </mc:AlternateContent>
   <p:timing>
     <p:tnLst>
       <p:par>
@@ -8272,6 +8545,18 @@
   <p:clrMapOvr>
     <a:masterClrMapping/>
   </p:clrMapOvr>
+  <mc:AlternateContent xmlns:mc="http://schemas.openxmlformats.org/markup-compatibility/2006">
+    <mc:Choice xmlns:p14="http://schemas.microsoft.com/office/powerpoint/2010/main" Requires="p14">
+      <p:transition spd="slow">
+        <p14:reveal/>
+      </p:transition>
+    </mc:Choice>
+    <mc:Fallback>
+      <p:transition spd="slow">
+        <p:fade/>
+      </p:transition>
+    </mc:Fallback>
+  </mc:AlternateContent>
   <p:timing>
     <p:tnLst>
       <p:par>

</xml_diff>